<commit_message>
Clean up folder structure for share
</commit_message>
<xml_diff>
--- a/Exp1/documentation/procedure.pptx
+++ b/Exp1/documentation/procedure.pptx
@@ -2,12 +2,12 @@
 <file path=ppt/presentation.xml><?xml version="1.0" encoding="utf-8"?>
 <p:presentation xmlns:a="http://schemas.openxmlformats.org/drawingml/2006/main" xmlns:r="http://schemas.openxmlformats.org/officeDocument/2006/relationships" xmlns:p="http://schemas.openxmlformats.org/presentationml/2006/main" saveSubsetFonts="1" autoCompressPictures="0">
   <p:sldMasterIdLst>
-    <p:sldMasterId id="2147483720" r:id="rId1"/>
+    <p:sldMasterId id="2147483768" r:id="rId1"/>
   </p:sldMasterIdLst>
   <p:sldIdLst>
     <p:sldId id="256" r:id="rId2"/>
   </p:sldIdLst>
-  <p:sldSz cx="14400213" cy="18000663"/>
+  <p:sldSz cx="14400213" cy="23399750"/>
   <p:notesSz cx="6858000" cy="9144000"/>
   <p:defaultTextStyle>
     <a:defPPr>
@@ -141,8 +141,8 @@
         </p:nvSpPr>
         <p:spPr>
           <a:xfrm>
-            <a:off x="1080016" y="2945943"/>
-            <a:ext cx="12240181" cy="6266897"/>
+            <a:off x="1080016" y="3829544"/>
+            <a:ext cx="12240181" cy="8146580"/>
           </a:xfrm>
         </p:spPr>
         <p:txBody>
@@ -173,8 +173,8 @@
         </p:nvSpPr>
         <p:spPr>
           <a:xfrm>
-            <a:off x="1800027" y="9454516"/>
-            <a:ext cx="10800160" cy="4345992"/>
+            <a:off x="1800027" y="12290287"/>
+            <a:ext cx="10800160" cy="5649521"/>
           </a:xfrm>
         </p:spPr>
         <p:txBody>
@@ -243,7 +243,7 @@
           <a:p>
             <a:fld id="{83474D19-0D05-334B-B602-0BA54860D52C}" type="datetimeFigureOut">
               <a:rPr lang="en-BE" smtClean="0"/>
-              <a:t>30/11/2022</a:t>
+              <a:t>20/04/2023</a:t>
             </a:fld>
             <a:endParaRPr lang="en-BE"/>
           </a:p>
@@ -294,7 +294,7 @@
     </p:spTree>
     <p:extLst>
       <p:ext uri="{BB962C8B-B14F-4D97-AF65-F5344CB8AC3E}">
-        <p14:creationId xmlns:p14="http://schemas.microsoft.com/office/powerpoint/2010/main" val="1401818619"/>
+        <p14:creationId xmlns:p14="http://schemas.microsoft.com/office/powerpoint/2010/main" val="3145906748"/>
       </p:ext>
     </p:extLst>
   </p:cSld>
@@ -413,7 +413,7 @@
           <a:p>
             <a:fld id="{83474D19-0D05-334B-B602-0BA54860D52C}" type="datetimeFigureOut">
               <a:rPr lang="en-BE" smtClean="0"/>
-              <a:t>30/11/2022</a:t>
+              <a:t>20/04/2023</a:t>
             </a:fld>
             <a:endParaRPr lang="en-BE"/>
           </a:p>
@@ -464,7 +464,7 @@
     </p:spTree>
     <p:extLst>
       <p:ext uri="{BB962C8B-B14F-4D97-AF65-F5344CB8AC3E}">
-        <p14:creationId xmlns:p14="http://schemas.microsoft.com/office/powerpoint/2010/main" val="2159455653"/>
+        <p14:creationId xmlns:p14="http://schemas.microsoft.com/office/powerpoint/2010/main" val="814879937"/>
       </p:ext>
     </p:extLst>
   </p:cSld>
@@ -503,8 +503,8 @@
         </p:nvSpPr>
         <p:spPr>
           <a:xfrm>
-            <a:off x="10305153" y="958369"/>
-            <a:ext cx="3105046" cy="15254730"/>
+            <a:off x="10305153" y="1245820"/>
+            <a:ext cx="3105046" cy="19830207"/>
           </a:xfrm>
         </p:spPr>
         <p:txBody>
@@ -531,8 +531,8 @@
         </p:nvSpPr>
         <p:spPr>
           <a:xfrm>
-            <a:off x="990015" y="958369"/>
-            <a:ext cx="9135135" cy="15254730"/>
+            <a:off x="990015" y="1245820"/>
+            <a:ext cx="9135135" cy="19830207"/>
           </a:xfrm>
         </p:spPr>
         <p:txBody>
@@ -593,7 +593,7 @@
           <a:p>
             <a:fld id="{83474D19-0D05-334B-B602-0BA54860D52C}" type="datetimeFigureOut">
               <a:rPr lang="en-BE" smtClean="0"/>
-              <a:t>30/11/2022</a:t>
+              <a:t>20/04/2023</a:t>
             </a:fld>
             <a:endParaRPr lang="en-BE"/>
           </a:p>
@@ -644,7 +644,7 @@
     </p:spTree>
     <p:extLst>
       <p:ext uri="{BB962C8B-B14F-4D97-AF65-F5344CB8AC3E}">
-        <p14:creationId xmlns:p14="http://schemas.microsoft.com/office/powerpoint/2010/main" val="2763972474"/>
+        <p14:creationId xmlns:p14="http://schemas.microsoft.com/office/powerpoint/2010/main" val="1079344867"/>
       </p:ext>
     </p:extLst>
   </p:cSld>
@@ -763,7 +763,7 @@
           <a:p>
             <a:fld id="{83474D19-0D05-334B-B602-0BA54860D52C}" type="datetimeFigureOut">
               <a:rPr lang="en-BE" smtClean="0"/>
-              <a:t>30/11/2022</a:t>
+              <a:t>20/04/2023</a:t>
             </a:fld>
             <a:endParaRPr lang="en-BE"/>
           </a:p>
@@ -814,7 +814,7 @@
     </p:spTree>
     <p:extLst>
       <p:ext uri="{BB962C8B-B14F-4D97-AF65-F5344CB8AC3E}">
-        <p14:creationId xmlns:p14="http://schemas.microsoft.com/office/powerpoint/2010/main" val="1205764283"/>
+        <p14:creationId xmlns:p14="http://schemas.microsoft.com/office/powerpoint/2010/main" val="1971758279"/>
       </p:ext>
     </p:extLst>
   </p:cSld>
@@ -853,8 +853,8 @@
         </p:nvSpPr>
         <p:spPr>
           <a:xfrm>
-            <a:off x="982515" y="4487671"/>
-            <a:ext cx="12420184" cy="7487774"/>
+            <a:off x="982515" y="5833695"/>
+            <a:ext cx="12420184" cy="9733644"/>
           </a:xfrm>
         </p:spPr>
         <p:txBody>
@@ -885,8 +885,8 @@
         </p:nvSpPr>
         <p:spPr>
           <a:xfrm>
-            <a:off x="982515" y="12046282"/>
-            <a:ext cx="12420184" cy="3937644"/>
+            <a:off x="982515" y="15659423"/>
+            <a:ext cx="12420184" cy="5118694"/>
           </a:xfrm>
         </p:spPr>
         <p:txBody>
@@ -1007,7 +1007,7 @@
           <a:p>
             <a:fld id="{83474D19-0D05-334B-B602-0BA54860D52C}" type="datetimeFigureOut">
               <a:rPr lang="en-BE" smtClean="0"/>
-              <a:t>30/11/2022</a:t>
+              <a:t>20/04/2023</a:t>
             </a:fld>
             <a:endParaRPr lang="en-BE"/>
           </a:p>
@@ -1058,7 +1058,7 @@
     </p:spTree>
     <p:extLst>
       <p:ext uri="{BB962C8B-B14F-4D97-AF65-F5344CB8AC3E}">
-        <p14:creationId xmlns:p14="http://schemas.microsoft.com/office/powerpoint/2010/main" val="1392598622"/>
+        <p14:creationId xmlns:p14="http://schemas.microsoft.com/office/powerpoint/2010/main" val="349066698"/>
       </p:ext>
     </p:extLst>
   </p:cSld>
@@ -1120,8 +1120,8 @@
         </p:nvSpPr>
         <p:spPr>
           <a:xfrm>
-            <a:off x="990014" y="4791843"/>
-            <a:ext cx="6120091" cy="11421255"/>
+            <a:off x="990014" y="6229100"/>
+            <a:ext cx="6120091" cy="14846926"/>
           </a:xfrm>
         </p:spPr>
         <p:txBody>
@@ -1177,8 +1177,8 @@
         </p:nvSpPr>
         <p:spPr>
           <a:xfrm>
-            <a:off x="7290108" y="4791843"/>
-            <a:ext cx="6120091" cy="11421255"/>
+            <a:off x="7290108" y="6229100"/>
+            <a:ext cx="6120091" cy="14846926"/>
           </a:xfrm>
         </p:spPr>
         <p:txBody>
@@ -1239,7 +1239,7 @@
           <a:p>
             <a:fld id="{83474D19-0D05-334B-B602-0BA54860D52C}" type="datetimeFigureOut">
               <a:rPr lang="en-BE" smtClean="0"/>
-              <a:t>30/11/2022</a:t>
+              <a:t>20/04/2023</a:t>
             </a:fld>
             <a:endParaRPr lang="en-BE"/>
           </a:p>
@@ -1290,7 +1290,7 @@
     </p:spTree>
     <p:extLst>
       <p:ext uri="{BB962C8B-B14F-4D97-AF65-F5344CB8AC3E}">
-        <p14:creationId xmlns:p14="http://schemas.microsoft.com/office/powerpoint/2010/main" val="1883927313"/>
+        <p14:creationId xmlns:p14="http://schemas.microsoft.com/office/powerpoint/2010/main" val="3630514274"/>
       </p:ext>
     </p:extLst>
   </p:cSld>
@@ -1329,8 +1329,8 @@
         </p:nvSpPr>
         <p:spPr>
           <a:xfrm>
-            <a:off x="991890" y="958373"/>
-            <a:ext cx="12420184" cy="3479296"/>
+            <a:off x="991890" y="1245825"/>
+            <a:ext cx="12420184" cy="4522870"/>
           </a:xfrm>
         </p:spPr>
         <p:txBody>
@@ -1357,8 +1357,8 @@
         </p:nvSpPr>
         <p:spPr>
           <a:xfrm>
-            <a:off x="991892" y="4412664"/>
-            <a:ext cx="6091964" cy="2162578"/>
+            <a:off x="991892" y="5736191"/>
+            <a:ext cx="6091964" cy="2811218"/>
           </a:xfrm>
         </p:spPr>
         <p:txBody>
@@ -1422,8 +1422,8 @@
         </p:nvSpPr>
         <p:spPr>
           <a:xfrm>
-            <a:off x="991892" y="6575242"/>
-            <a:ext cx="6091964" cy="9671191"/>
+            <a:off x="991892" y="8547409"/>
+            <a:ext cx="6091964" cy="12571951"/>
           </a:xfrm>
         </p:spPr>
         <p:txBody>
@@ -1479,8 +1479,8 @@
         </p:nvSpPr>
         <p:spPr>
           <a:xfrm>
-            <a:off x="7290109" y="4412664"/>
-            <a:ext cx="6121966" cy="2162578"/>
+            <a:off x="7290109" y="5736191"/>
+            <a:ext cx="6121966" cy="2811218"/>
           </a:xfrm>
         </p:spPr>
         <p:txBody>
@@ -1544,8 +1544,8 @@
         </p:nvSpPr>
         <p:spPr>
           <a:xfrm>
-            <a:off x="7290109" y="6575242"/>
-            <a:ext cx="6121966" cy="9671191"/>
+            <a:off x="7290109" y="8547409"/>
+            <a:ext cx="6121966" cy="12571951"/>
           </a:xfrm>
         </p:spPr>
         <p:txBody>
@@ -1606,7 +1606,7 @@
           <a:p>
             <a:fld id="{83474D19-0D05-334B-B602-0BA54860D52C}" type="datetimeFigureOut">
               <a:rPr lang="en-BE" smtClean="0"/>
-              <a:t>30/11/2022</a:t>
+              <a:t>20/04/2023</a:t>
             </a:fld>
             <a:endParaRPr lang="en-BE"/>
           </a:p>
@@ -1657,7 +1657,7 @@
     </p:spTree>
     <p:extLst>
       <p:ext uri="{BB962C8B-B14F-4D97-AF65-F5344CB8AC3E}">
-        <p14:creationId xmlns:p14="http://schemas.microsoft.com/office/powerpoint/2010/main" val="580692254"/>
+        <p14:creationId xmlns:p14="http://schemas.microsoft.com/office/powerpoint/2010/main" val="3557621576"/>
       </p:ext>
     </p:extLst>
   </p:cSld>
@@ -1724,7 +1724,7 @@
           <a:p>
             <a:fld id="{83474D19-0D05-334B-B602-0BA54860D52C}" type="datetimeFigureOut">
               <a:rPr lang="en-BE" smtClean="0"/>
-              <a:t>30/11/2022</a:t>
+              <a:t>20/04/2023</a:t>
             </a:fld>
             <a:endParaRPr lang="en-BE"/>
           </a:p>
@@ -1775,7 +1775,7 @@
     </p:spTree>
     <p:extLst>
       <p:ext uri="{BB962C8B-B14F-4D97-AF65-F5344CB8AC3E}">
-        <p14:creationId xmlns:p14="http://schemas.microsoft.com/office/powerpoint/2010/main" val="4251079330"/>
+        <p14:creationId xmlns:p14="http://schemas.microsoft.com/office/powerpoint/2010/main" val="1211669336"/>
       </p:ext>
     </p:extLst>
   </p:cSld>
@@ -1819,7 +1819,7 @@
           <a:p>
             <a:fld id="{83474D19-0D05-334B-B602-0BA54860D52C}" type="datetimeFigureOut">
               <a:rPr lang="en-BE" smtClean="0"/>
-              <a:t>30/11/2022</a:t>
+              <a:t>20/04/2023</a:t>
             </a:fld>
             <a:endParaRPr lang="en-BE"/>
           </a:p>
@@ -1870,7 +1870,7 @@
     </p:spTree>
     <p:extLst>
       <p:ext uri="{BB962C8B-B14F-4D97-AF65-F5344CB8AC3E}">
-        <p14:creationId xmlns:p14="http://schemas.microsoft.com/office/powerpoint/2010/main" val="4201525775"/>
+        <p14:creationId xmlns:p14="http://schemas.microsoft.com/office/powerpoint/2010/main" val="3699999502"/>
       </p:ext>
     </p:extLst>
   </p:cSld>
@@ -1909,8 +1909,8 @@
         </p:nvSpPr>
         <p:spPr>
           <a:xfrm>
-            <a:off x="991890" y="1200044"/>
-            <a:ext cx="4644444" cy="4200155"/>
+            <a:off x="991890" y="1559983"/>
+            <a:ext cx="4644444" cy="5459942"/>
           </a:xfrm>
         </p:spPr>
         <p:txBody>
@@ -1941,8 +1941,8 @@
         </p:nvSpPr>
         <p:spPr>
           <a:xfrm>
-            <a:off x="6121966" y="2591766"/>
-            <a:ext cx="7290108" cy="12792138"/>
+            <a:off x="6121966" y="3369136"/>
+            <a:ext cx="7290108" cy="16628989"/>
           </a:xfrm>
         </p:spPr>
         <p:txBody>
@@ -2026,8 +2026,8 @@
         </p:nvSpPr>
         <p:spPr>
           <a:xfrm>
-            <a:off x="991890" y="5400199"/>
-            <a:ext cx="4644444" cy="10004536"/>
+            <a:off x="991890" y="7019925"/>
+            <a:ext cx="4644444" cy="13005279"/>
           </a:xfrm>
         </p:spPr>
         <p:txBody>
@@ -2096,7 +2096,7 @@
           <a:p>
             <a:fld id="{83474D19-0D05-334B-B602-0BA54860D52C}" type="datetimeFigureOut">
               <a:rPr lang="en-BE" smtClean="0"/>
-              <a:t>30/11/2022</a:t>
+              <a:t>20/04/2023</a:t>
             </a:fld>
             <a:endParaRPr lang="en-BE"/>
           </a:p>
@@ -2147,7 +2147,7 @@
     </p:spTree>
     <p:extLst>
       <p:ext uri="{BB962C8B-B14F-4D97-AF65-F5344CB8AC3E}">
-        <p14:creationId xmlns:p14="http://schemas.microsoft.com/office/powerpoint/2010/main" val="2742915564"/>
+        <p14:creationId xmlns:p14="http://schemas.microsoft.com/office/powerpoint/2010/main" val="2611441152"/>
       </p:ext>
     </p:extLst>
   </p:cSld>
@@ -2186,8 +2186,8 @@
         </p:nvSpPr>
         <p:spPr>
           <a:xfrm>
-            <a:off x="991890" y="1200044"/>
-            <a:ext cx="4644444" cy="4200155"/>
+            <a:off x="991890" y="1559983"/>
+            <a:ext cx="4644444" cy="5459942"/>
           </a:xfrm>
         </p:spPr>
         <p:txBody>
@@ -2218,8 +2218,8 @@
         </p:nvSpPr>
         <p:spPr>
           <a:xfrm>
-            <a:off x="6121966" y="2591766"/>
-            <a:ext cx="7290108" cy="12792138"/>
+            <a:off x="6121966" y="3369136"/>
+            <a:ext cx="7290108" cy="16628989"/>
           </a:xfrm>
         </p:spPr>
         <p:txBody>
@@ -2283,8 +2283,8 @@
         </p:nvSpPr>
         <p:spPr>
           <a:xfrm>
-            <a:off x="991890" y="5400199"/>
-            <a:ext cx="4644444" cy="10004536"/>
+            <a:off x="991890" y="7019925"/>
+            <a:ext cx="4644444" cy="13005279"/>
           </a:xfrm>
         </p:spPr>
         <p:txBody>
@@ -2353,7 +2353,7 @@
           <a:p>
             <a:fld id="{83474D19-0D05-334B-B602-0BA54860D52C}" type="datetimeFigureOut">
               <a:rPr lang="en-BE" smtClean="0"/>
-              <a:t>30/11/2022</a:t>
+              <a:t>20/04/2023</a:t>
             </a:fld>
             <a:endParaRPr lang="en-BE"/>
           </a:p>
@@ -2404,7 +2404,7 @@
     </p:spTree>
     <p:extLst>
       <p:ext uri="{BB962C8B-B14F-4D97-AF65-F5344CB8AC3E}">
-        <p14:creationId xmlns:p14="http://schemas.microsoft.com/office/powerpoint/2010/main" val="1830843658"/>
+        <p14:creationId xmlns:p14="http://schemas.microsoft.com/office/powerpoint/2010/main" val="1767575455"/>
       </p:ext>
     </p:extLst>
   </p:cSld>
@@ -2448,8 +2448,8 @@
         </p:nvSpPr>
         <p:spPr>
           <a:xfrm>
-            <a:off x="990015" y="958373"/>
-            <a:ext cx="12420184" cy="3479296"/>
+            <a:off x="990015" y="1245825"/>
+            <a:ext cx="12420184" cy="4522870"/>
           </a:xfrm>
           <a:prstGeom prst="rect">
             <a:avLst/>
@@ -2481,8 +2481,8 @@
         </p:nvSpPr>
         <p:spPr>
           <a:xfrm>
-            <a:off x="990015" y="4791843"/>
-            <a:ext cx="12420184" cy="11421255"/>
+            <a:off x="990015" y="6229100"/>
+            <a:ext cx="12420184" cy="14846926"/>
           </a:xfrm>
           <a:prstGeom prst="rect">
             <a:avLst/>
@@ -2543,8 +2543,8 @@
         </p:nvSpPr>
         <p:spPr>
           <a:xfrm>
-            <a:off x="990015" y="16683952"/>
-            <a:ext cx="3240048" cy="958369"/>
+            <a:off x="990015" y="21688107"/>
+            <a:ext cx="3240048" cy="1245820"/>
           </a:xfrm>
           <a:prstGeom prst="rect">
             <a:avLst/>
@@ -2566,7 +2566,7 @@
           <a:p>
             <a:fld id="{83474D19-0D05-334B-B602-0BA54860D52C}" type="datetimeFigureOut">
               <a:rPr lang="en-BE" smtClean="0"/>
-              <a:t>30/11/2022</a:t>
+              <a:t>20/04/2023</a:t>
             </a:fld>
             <a:endParaRPr lang="en-BE"/>
           </a:p>
@@ -2584,8 +2584,8 @@
         </p:nvSpPr>
         <p:spPr>
           <a:xfrm>
-            <a:off x="4770071" y="16683952"/>
-            <a:ext cx="4860072" cy="958369"/>
+            <a:off x="4770071" y="21688107"/>
+            <a:ext cx="4860072" cy="1245820"/>
           </a:xfrm>
           <a:prstGeom prst="rect">
             <a:avLst/>
@@ -2621,8 +2621,8 @@
         </p:nvSpPr>
         <p:spPr>
           <a:xfrm>
-            <a:off x="10170150" y="16683952"/>
-            <a:ext cx="3240048" cy="958369"/>
+            <a:off x="10170150" y="21688107"/>
+            <a:ext cx="3240048" cy="1245820"/>
           </a:xfrm>
           <a:prstGeom prst="rect">
             <a:avLst/>
@@ -2653,23 +2653,23 @@
     </p:spTree>
     <p:extLst>
       <p:ext uri="{BB962C8B-B14F-4D97-AF65-F5344CB8AC3E}">
-        <p14:creationId xmlns:p14="http://schemas.microsoft.com/office/powerpoint/2010/main" val="1730161060"/>
+        <p14:creationId xmlns:p14="http://schemas.microsoft.com/office/powerpoint/2010/main" val="357952642"/>
       </p:ext>
     </p:extLst>
   </p:cSld>
   <p:clrMap bg1="lt1" tx1="dk1" bg2="lt2" tx2="dk2" accent1="accent1" accent2="accent2" accent3="accent3" accent4="accent4" accent5="accent5" accent6="accent6" hlink="hlink" folHlink="folHlink"/>
   <p:sldLayoutIdLst>
-    <p:sldLayoutId id="2147483721" r:id="rId1"/>
-    <p:sldLayoutId id="2147483722" r:id="rId2"/>
-    <p:sldLayoutId id="2147483723" r:id="rId3"/>
-    <p:sldLayoutId id="2147483724" r:id="rId4"/>
-    <p:sldLayoutId id="2147483725" r:id="rId5"/>
-    <p:sldLayoutId id="2147483726" r:id="rId6"/>
-    <p:sldLayoutId id="2147483727" r:id="rId7"/>
-    <p:sldLayoutId id="2147483728" r:id="rId8"/>
-    <p:sldLayoutId id="2147483729" r:id="rId9"/>
-    <p:sldLayoutId id="2147483730" r:id="rId10"/>
-    <p:sldLayoutId id="2147483731" r:id="rId11"/>
+    <p:sldLayoutId id="2147483769" r:id="rId1"/>
+    <p:sldLayoutId id="2147483770" r:id="rId2"/>
+    <p:sldLayoutId id="2147483771" r:id="rId3"/>
+    <p:sldLayoutId id="2147483772" r:id="rId4"/>
+    <p:sldLayoutId id="2147483773" r:id="rId5"/>
+    <p:sldLayoutId id="2147483774" r:id="rId6"/>
+    <p:sldLayoutId id="2147483775" r:id="rId7"/>
+    <p:sldLayoutId id="2147483776" r:id="rId8"/>
+    <p:sldLayoutId id="2147483777" r:id="rId9"/>
+    <p:sldLayoutId id="2147483778" r:id="rId10"/>
+    <p:sldLayoutId id="2147483779" r:id="rId11"/>
   </p:sldLayoutIdLst>
   <p:txStyles>
     <p:titleStyle>
@@ -2971,612 +2971,12 @@
           <a:chExt cx="0" cy="0"/>
         </a:xfrm>
       </p:grpSpPr>
-      <p:sp>
-        <p:nvSpPr>
-          <p:cNvPr id="4" name="Rectangle 3">
+      <p:grpSp>
+        <p:nvGrpSpPr>
+          <p:cNvPr id="79" name="Group 78">
             <a:extLst>
               <a:ext uri="{FF2B5EF4-FFF2-40B4-BE49-F238E27FC236}">
-                <a16:creationId xmlns:a16="http://schemas.microsoft.com/office/drawing/2014/main" id="{28A8A818-C2BB-5E2A-FB9E-2D206A4281E9}"/>
-              </a:ext>
-            </a:extLst>
-          </p:cNvPr>
-          <p:cNvSpPr/>
-          <p:nvPr/>
-        </p:nvSpPr>
-        <p:spPr>
-          <a:xfrm>
-            <a:off x="1879168" y="481975"/>
-            <a:ext cx="5050972" cy="3669475"/>
-          </a:xfrm>
-          <a:prstGeom prst="rect">
-            <a:avLst/>
-          </a:prstGeom>
-          <a:noFill/>
-          <a:ln w="38100">
-            <a:solidFill>
-              <a:schemeClr val="tx1"/>
-            </a:solidFill>
-          </a:ln>
-          <a:effectLst/>
-        </p:spPr>
-        <p:style>
-          <a:lnRef idx="2">
-            <a:schemeClr val="accent1">
-              <a:shade val="50000"/>
-            </a:schemeClr>
-          </a:lnRef>
-          <a:fillRef idx="1">
-            <a:schemeClr val="accent1"/>
-          </a:fillRef>
-          <a:effectRef idx="0">
-            <a:schemeClr val="accent1"/>
-          </a:effectRef>
-          <a:fontRef idx="minor">
-            <a:schemeClr val="lt1"/>
-          </a:fontRef>
-        </p:style>
-        <p:txBody>
-          <a:bodyPr rtlCol="0" anchor="ctr"/>
-          <a:lstStyle/>
-          <a:p>
-            <a:pPr algn="ctr"/>
-            <a:r>
-              <a:rPr lang="en-BE" sz="5200" dirty="0">
-                <a:solidFill>
-                  <a:schemeClr val="tx1"/>
-                </a:solidFill>
-              </a:rPr>
-              <a:t>Press the space bar to start a </a:t>
-            </a:r>
-            <a:r>
-              <a:rPr lang="en-BE" sz="5200" b="1" dirty="0">
-                <a:solidFill>
-                  <a:schemeClr val="tx1"/>
-                </a:solidFill>
-              </a:rPr>
-              <a:t>guess</a:t>
-            </a:r>
-            <a:r>
-              <a:rPr lang="en-BE" sz="5200" dirty="0">
-                <a:solidFill>
-                  <a:schemeClr val="tx1"/>
-                </a:solidFill>
-              </a:rPr>
-              <a:t> game.</a:t>
-            </a:r>
-          </a:p>
-        </p:txBody>
-      </p:sp>
-      <p:sp>
-        <p:nvSpPr>
-          <p:cNvPr id="16" name="Rectangle 15">
-            <a:extLst>
-              <a:ext uri="{FF2B5EF4-FFF2-40B4-BE49-F238E27FC236}">
-                <a16:creationId xmlns:a16="http://schemas.microsoft.com/office/drawing/2014/main" id="{330E4BD8-4C22-8BB6-9681-79CF15BE71EF}"/>
-              </a:ext>
-            </a:extLst>
-          </p:cNvPr>
-          <p:cNvSpPr/>
-          <p:nvPr/>
-        </p:nvSpPr>
-        <p:spPr>
-          <a:xfrm>
-            <a:off x="8859962" y="481974"/>
-            <a:ext cx="5050972" cy="3669475"/>
-          </a:xfrm>
-          <a:prstGeom prst="rect">
-            <a:avLst/>
-          </a:prstGeom>
-          <a:noFill/>
-          <a:ln w="38100">
-            <a:solidFill>
-              <a:schemeClr val="tx1"/>
-            </a:solidFill>
-          </a:ln>
-          <a:effectLst/>
-        </p:spPr>
-        <p:style>
-          <a:lnRef idx="2">
-            <a:schemeClr val="accent1">
-              <a:shade val="50000"/>
-            </a:schemeClr>
-          </a:lnRef>
-          <a:fillRef idx="1">
-            <a:schemeClr val="accent1"/>
-          </a:fillRef>
-          <a:effectRef idx="0">
-            <a:schemeClr val="accent1"/>
-          </a:effectRef>
-          <a:fontRef idx="minor">
-            <a:schemeClr val="lt1"/>
-          </a:fontRef>
-        </p:style>
-        <p:txBody>
-          <a:bodyPr rtlCol="0" anchor="ctr"/>
-          <a:lstStyle/>
-          <a:p>
-            <a:pPr algn="ctr"/>
-            <a:r>
-              <a:rPr lang="en-BE" sz="5200" dirty="0">
-                <a:solidFill>
-                  <a:schemeClr val="tx1"/>
-                </a:solidFill>
-              </a:rPr>
-              <a:t>Loading the game… </a:t>
-            </a:r>
-          </a:p>
-        </p:txBody>
-      </p:sp>
-      <p:sp>
-        <p:nvSpPr>
-          <p:cNvPr id="17" name="Rectangle 16">
-            <a:extLst>
-              <a:ext uri="{FF2B5EF4-FFF2-40B4-BE49-F238E27FC236}">
-                <a16:creationId xmlns:a16="http://schemas.microsoft.com/office/drawing/2014/main" id="{C8670502-8E25-3617-5AEB-D13990C98A79}"/>
-              </a:ext>
-            </a:extLst>
-          </p:cNvPr>
-          <p:cNvSpPr/>
-          <p:nvPr/>
-        </p:nvSpPr>
-        <p:spPr>
-          <a:xfrm>
-            <a:off x="8859962" y="4945119"/>
-            <a:ext cx="5050972" cy="3669475"/>
-          </a:xfrm>
-          <a:prstGeom prst="rect">
-            <a:avLst/>
-          </a:prstGeom>
-          <a:noFill/>
-          <a:ln w="38100">
-            <a:solidFill>
-              <a:schemeClr val="tx1"/>
-            </a:solidFill>
-          </a:ln>
-          <a:effectLst/>
-        </p:spPr>
-        <p:style>
-          <a:lnRef idx="2">
-            <a:schemeClr val="accent1">
-              <a:shade val="50000"/>
-            </a:schemeClr>
-          </a:lnRef>
-          <a:fillRef idx="1">
-            <a:schemeClr val="accent1"/>
-          </a:fillRef>
-          <a:effectRef idx="0">
-            <a:schemeClr val="accent1"/>
-          </a:effectRef>
-          <a:fontRef idx="minor">
-            <a:schemeClr val="lt1"/>
-          </a:fontRef>
-        </p:style>
-        <p:txBody>
-          <a:bodyPr rtlCol="0" anchor="ctr"/>
-          <a:lstStyle/>
-          <a:p>
-            <a:pPr algn="ctr"/>
-            <a:r>
-              <a:rPr lang="en-BE" sz="5200" dirty="0">
-                <a:solidFill>
-                  <a:schemeClr val="tx1"/>
-                </a:solidFill>
-              </a:rPr>
-              <a:t>Press the space bar to start a </a:t>
-            </a:r>
-            <a:r>
-              <a:rPr lang="en-BE" sz="5200" b="1" dirty="0">
-                <a:solidFill>
-                  <a:schemeClr val="tx1"/>
-                </a:solidFill>
-              </a:rPr>
-              <a:t>choice</a:t>
-            </a:r>
-            <a:r>
-              <a:rPr lang="en-BE" sz="5200" dirty="0">
-                <a:solidFill>
-                  <a:schemeClr val="tx1"/>
-                </a:solidFill>
-              </a:rPr>
-              <a:t> game.</a:t>
-            </a:r>
-          </a:p>
-          <a:p>
-            <a:pPr algn="ctr"/>
-            <a:endParaRPr lang="en-BE" dirty="0"/>
-          </a:p>
-        </p:txBody>
-      </p:sp>
-      <p:sp>
-        <p:nvSpPr>
-          <p:cNvPr id="18" name="Rectangle 17">
-            <a:extLst>
-              <a:ext uri="{FF2B5EF4-FFF2-40B4-BE49-F238E27FC236}">
-                <a16:creationId xmlns:a16="http://schemas.microsoft.com/office/drawing/2014/main" id="{962FDB0B-5465-478C-0625-E98E34D750FD}"/>
-              </a:ext>
-            </a:extLst>
-          </p:cNvPr>
-          <p:cNvSpPr/>
-          <p:nvPr/>
-        </p:nvSpPr>
-        <p:spPr>
-          <a:xfrm>
-            <a:off x="8859962" y="9408263"/>
-            <a:ext cx="5050972" cy="3669475"/>
-          </a:xfrm>
-          <a:prstGeom prst="rect">
-            <a:avLst/>
-          </a:prstGeom>
-          <a:noFill/>
-          <a:ln w="38100">
-            <a:solidFill>
-              <a:schemeClr val="tx1"/>
-            </a:solidFill>
-          </a:ln>
-          <a:effectLst/>
-        </p:spPr>
-        <p:style>
-          <a:lnRef idx="2">
-            <a:schemeClr val="accent1">
-              <a:shade val="50000"/>
-            </a:schemeClr>
-          </a:lnRef>
-          <a:fillRef idx="1">
-            <a:schemeClr val="accent1"/>
-          </a:fillRef>
-          <a:effectRef idx="0">
-            <a:schemeClr val="accent1"/>
-          </a:effectRef>
-          <a:fontRef idx="minor">
-            <a:schemeClr val="lt1"/>
-          </a:fontRef>
-        </p:style>
-        <p:txBody>
-          <a:bodyPr rtlCol="0" anchor="ctr"/>
-          <a:lstStyle/>
-          <a:p>
-            <a:pPr algn="ctr"/>
-            <a:endParaRPr lang="en-BE"/>
-          </a:p>
-        </p:txBody>
-      </p:sp>
-      <p:sp>
-        <p:nvSpPr>
-          <p:cNvPr id="19" name="Rectangle 18">
-            <a:extLst>
-              <a:ext uri="{FF2B5EF4-FFF2-40B4-BE49-F238E27FC236}">
-                <a16:creationId xmlns:a16="http://schemas.microsoft.com/office/drawing/2014/main" id="{4C6BE0B4-CF05-898D-B738-EE523C5DAC54}"/>
-              </a:ext>
-            </a:extLst>
-          </p:cNvPr>
-          <p:cNvSpPr/>
-          <p:nvPr/>
-        </p:nvSpPr>
-        <p:spPr>
-          <a:xfrm>
-            <a:off x="8859962" y="13871407"/>
-            <a:ext cx="5050972" cy="3669475"/>
-          </a:xfrm>
-          <a:prstGeom prst="rect">
-            <a:avLst/>
-          </a:prstGeom>
-          <a:noFill/>
-          <a:ln w="38100">
-            <a:solidFill>
-              <a:schemeClr val="tx1"/>
-            </a:solidFill>
-          </a:ln>
-          <a:effectLst/>
-        </p:spPr>
-        <p:style>
-          <a:lnRef idx="2">
-            <a:schemeClr val="accent1">
-              <a:shade val="50000"/>
-            </a:schemeClr>
-          </a:lnRef>
-          <a:fillRef idx="1">
-            <a:schemeClr val="accent1"/>
-          </a:fillRef>
-          <a:effectRef idx="0">
-            <a:schemeClr val="accent1"/>
-          </a:effectRef>
-          <a:fontRef idx="minor">
-            <a:schemeClr val="lt1"/>
-          </a:fontRef>
-        </p:style>
-        <p:txBody>
-          <a:bodyPr rtlCol="0" anchor="ctr"/>
-          <a:lstStyle/>
-          <a:p>
-            <a:pPr algn="ctr"/>
-            <a:endParaRPr lang="en-BE"/>
-          </a:p>
-        </p:txBody>
-      </p:sp>
-      <p:sp>
-        <p:nvSpPr>
-          <p:cNvPr id="20" name="Rectangle 19">
-            <a:extLst>
-              <a:ext uri="{FF2B5EF4-FFF2-40B4-BE49-F238E27FC236}">
-                <a16:creationId xmlns:a16="http://schemas.microsoft.com/office/drawing/2014/main" id="{4EB70585-B073-8732-3CB0-EB476F043690}"/>
-              </a:ext>
-            </a:extLst>
-          </p:cNvPr>
-          <p:cNvSpPr/>
-          <p:nvPr/>
-        </p:nvSpPr>
-        <p:spPr>
-          <a:xfrm>
-            <a:off x="1879166" y="4945119"/>
-            <a:ext cx="5050972" cy="3669475"/>
-          </a:xfrm>
-          <a:prstGeom prst="rect">
-            <a:avLst/>
-          </a:prstGeom>
-          <a:noFill/>
-          <a:ln w="38100">
-            <a:solidFill>
-              <a:schemeClr val="tx1"/>
-            </a:solidFill>
-          </a:ln>
-          <a:effectLst/>
-        </p:spPr>
-        <p:style>
-          <a:lnRef idx="2">
-            <a:schemeClr val="accent1">
-              <a:shade val="50000"/>
-            </a:schemeClr>
-          </a:lnRef>
-          <a:fillRef idx="1">
-            <a:schemeClr val="accent1"/>
-          </a:fillRef>
-          <a:effectRef idx="0">
-            <a:schemeClr val="accent1"/>
-          </a:effectRef>
-          <a:fontRef idx="minor">
-            <a:schemeClr val="lt1"/>
-          </a:fontRef>
-        </p:style>
-        <p:txBody>
-          <a:bodyPr rtlCol="0" anchor="ctr"/>
-          <a:lstStyle/>
-          <a:p>
-            <a:pPr algn="ctr"/>
-            <a:endParaRPr lang="en-BE"/>
-          </a:p>
-        </p:txBody>
-      </p:sp>
-      <p:sp>
-        <p:nvSpPr>
-          <p:cNvPr id="21" name="Rectangle 20">
-            <a:extLst>
-              <a:ext uri="{FF2B5EF4-FFF2-40B4-BE49-F238E27FC236}">
-                <a16:creationId xmlns:a16="http://schemas.microsoft.com/office/drawing/2014/main" id="{079CE0F1-387A-DD06-AA18-13B314F3C109}"/>
-              </a:ext>
-            </a:extLst>
-          </p:cNvPr>
-          <p:cNvSpPr/>
-          <p:nvPr/>
-        </p:nvSpPr>
-        <p:spPr>
-          <a:xfrm>
-            <a:off x="1879166" y="9408263"/>
-            <a:ext cx="5050972" cy="3669475"/>
-          </a:xfrm>
-          <a:prstGeom prst="rect">
-            <a:avLst/>
-          </a:prstGeom>
-          <a:noFill/>
-          <a:ln w="38100">
-            <a:solidFill>
-              <a:schemeClr val="tx1"/>
-            </a:solidFill>
-          </a:ln>
-          <a:effectLst/>
-        </p:spPr>
-        <p:style>
-          <a:lnRef idx="2">
-            <a:schemeClr val="accent1">
-              <a:shade val="50000"/>
-            </a:schemeClr>
-          </a:lnRef>
-          <a:fillRef idx="1">
-            <a:schemeClr val="accent1"/>
-          </a:fillRef>
-          <a:effectRef idx="0">
-            <a:schemeClr val="accent1"/>
-          </a:effectRef>
-          <a:fontRef idx="minor">
-            <a:schemeClr val="lt1"/>
-          </a:fontRef>
-        </p:style>
-        <p:txBody>
-          <a:bodyPr rtlCol="0" anchor="ctr"/>
-          <a:lstStyle/>
-          <a:p>
-            <a:pPr algn="ctr"/>
-            <a:endParaRPr lang="en-BE"/>
-          </a:p>
-        </p:txBody>
-      </p:sp>
-      <p:pic>
-        <p:nvPicPr>
-          <p:cNvPr id="24" name="Picture 23" descr="A picture containing umbrella, accessory, stool, vector graphics&#10;&#10;Description automatically generated">
-            <a:extLst>
-              <a:ext uri="{FF2B5EF4-FFF2-40B4-BE49-F238E27FC236}">
-                <a16:creationId xmlns:a16="http://schemas.microsoft.com/office/drawing/2014/main" id="{CD512B21-4190-0839-BB0E-3C82064B5E1B}"/>
-              </a:ext>
-            </a:extLst>
-          </p:cNvPr>
-          <p:cNvPicPr>
-            <a:picLocks noChangeAspect="1"/>
-          </p:cNvPicPr>
-          <p:nvPr/>
-        </p:nvPicPr>
-        <p:blipFill rotWithShape="1">
-          <a:blip r:embed="rId2"/>
-          <a:srcRect l="1648" r="2007"/>
-          <a:stretch/>
-        </p:blipFill>
-        <p:spPr>
-          <a:xfrm>
-            <a:off x="8940654" y="9678750"/>
-            <a:ext cx="4887317" cy="3128499"/>
-          </a:xfrm>
-          <a:prstGeom prst="rect">
-            <a:avLst/>
-          </a:prstGeom>
-        </p:spPr>
-      </p:pic>
-      <p:pic>
-        <p:nvPicPr>
-          <p:cNvPr id="26" name="Picture 25" descr="A picture containing accessory, umbrella, vector graphics&#10;&#10;Description automatically generated">
-            <a:extLst>
-              <a:ext uri="{FF2B5EF4-FFF2-40B4-BE49-F238E27FC236}">
-                <a16:creationId xmlns:a16="http://schemas.microsoft.com/office/drawing/2014/main" id="{67362C98-750E-DEC6-8C41-505ED72DD9E1}"/>
-              </a:ext>
-            </a:extLst>
-          </p:cNvPr>
-          <p:cNvPicPr>
-            <a:picLocks noChangeAspect="1"/>
-          </p:cNvPicPr>
-          <p:nvPr/>
-        </p:nvPicPr>
-        <p:blipFill rotWithShape="1">
-          <a:blip r:embed="rId3"/>
-          <a:srcRect t="5131" b="5426"/>
-          <a:stretch/>
-        </p:blipFill>
-        <p:spPr>
-          <a:xfrm>
-            <a:off x="9920919" y="14098543"/>
-            <a:ext cx="2926780" cy="3215201"/>
-          </a:xfrm>
-          <a:prstGeom prst="rect">
-            <a:avLst/>
-          </a:prstGeom>
-        </p:spPr>
-      </p:pic>
-      <p:pic>
-        <p:nvPicPr>
-          <p:cNvPr id="28" name="Picture 27" descr="Pie chart&#10;&#10;Description automatically generated with medium confidence">
-            <a:extLst>
-              <a:ext uri="{FF2B5EF4-FFF2-40B4-BE49-F238E27FC236}">
-                <a16:creationId xmlns:a16="http://schemas.microsoft.com/office/drawing/2014/main" id="{8CEED8DE-B13B-1071-1FD7-E41B9424ED83}"/>
-              </a:ext>
-            </a:extLst>
-          </p:cNvPr>
-          <p:cNvPicPr>
-            <a:picLocks noChangeAspect="1"/>
-          </p:cNvPicPr>
-          <p:nvPr/>
-        </p:nvPicPr>
-        <p:blipFill>
-          <a:blip r:embed="rId4"/>
-          <a:stretch>
-            <a:fillRect/>
-          </a:stretch>
-        </p:blipFill>
-        <p:spPr>
-          <a:xfrm>
-            <a:off x="2363109" y="5085540"/>
-            <a:ext cx="4083091" cy="3388631"/>
-          </a:xfrm>
-          <a:prstGeom prst="rect">
-            <a:avLst/>
-          </a:prstGeom>
-        </p:spPr>
-      </p:pic>
-      <p:pic>
-        <p:nvPicPr>
-          <p:cNvPr id="30" name="Picture 29" descr="A picture containing pie chart&#10;&#10;Description automatically generated">
-            <a:extLst>
-              <a:ext uri="{FF2B5EF4-FFF2-40B4-BE49-F238E27FC236}">
-                <a16:creationId xmlns:a16="http://schemas.microsoft.com/office/drawing/2014/main" id="{CFD615E8-3337-95FD-E4DD-0766CB9DD5EE}"/>
-              </a:ext>
-            </a:extLst>
-          </p:cNvPr>
-          <p:cNvPicPr>
-            <a:picLocks noChangeAspect="1"/>
-          </p:cNvPicPr>
-          <p:nvPr/>
-        </p:nvPicPr>
-        <p:blipFill>
-          <a:blip r:embed="rId5"/>
-          <a:stretch>
-            <a:fillRect/>
-          </a:stretch>
-        </p:blipFill>
-        <p:spPr>
-          <a:xfrm>
-            <a:off x="2271457" y="9522138"/>
-            <a:ext cx="4266388" cy="3441721"/>
-          </a:xfrm>
-          <a:prstGeom prst="rect">
-            <a:avLst/>
-          </a:prstGeom>
-        </p:spPr>
-      </p:pic>
-      <p:sp>
-        <p:nvSpPr>
-          <p:cNvPr id="33" name="Down Arrow 32">
-            <a:extLst>
-              <a:ext uri="{FF2B5EF4-FFF2-40B4-BE49-F238E27FC236}">
-                <a16:creationId xmlns:a16="http://schemas.microsoft.com/office/drawing/2014/main" id="{4000978A-5568-523C-759B-AA0FFC699A59}"/>
-              </a:ext>
-            </a:extLst>
-          </p:cNvPr>
-          <p:cNvSpPr/>
-          <p:nvPr/>
-        </p:nvSpPr>
-        <p:spPr>
-          <a:xfrm>
-            <a:off x="4134651" y="4277044"/>
-            <a:ext cx="540000" cy="540000"/>
-          </a:xfrm>
-          <a:prstGeom prst="downArrow">
-            <a:avLst/>
-          </a:prstGeom>
-          <a:solidFill>
-            <a:schemeClr val="bg2">
-              <a:lumMod val="90000"/>
-            </a:schemeClr>
-          </a:solidFill>
-          <a:ln>
-            <a:noFill/>
-          </a:ln>
-        </p:spPr>
-        <p:style>
-          <a:lnRef idx="2">
-            <a:schemeClr val="accent1">
-              <a:shade val="50000"/>
-            </a:schemeClr>
-          </a:lnRef>
-          <a:fillRef idx="1">
-            <a:schemeClr val="accent1"/>
-          </a:fillRef>
-          <a:effectRef idx="0">
-            <a:schemeClr val="accent1"/>
-          </a:effectRef>
-          <a:fontRef idx="minor">
-            <a:schemeClr val="lt1"/>
-          </a:fontRef>
-        </p:style>
-        <p:txBody>
-          <a:bodyPr rtlCol="0" anchor="ctr"/>
-          <a:lstStyle/>
-          <a:p>
-            <a:pPr algn="ctr"/>
-            <a:endParaRPr lang="en-BE"/>
-          </a:p>
-        </p:txBody>
-      </p:sp>
-      <p:grpSp>
-        <p:nvGrpSpPr>
-          <p:cNvPr id="51" name="Group 50">
-            <a:extLst>
-              <a:ext uri="{FF2B5EF4-FFF2-40B4-BE49-F238E27FC236}">
-                <a16:creationId xmlns:a16="http://schemas.microsoft.com/office/drawing/2014/main" id="{2D2B5409-8E21-973D-73CC-AA00E1068EE9}"/>
+                <a16:creationId xmlns:a16="http://schemas.microsoft.com/office/drawing/2014/main" id="{160C4FD7-BC25-DF59-53BD-BFBE6D5AC269}"/>
               </a:ext>
             </a:extLst>
           </p:cNvPr>
@@ -3585,406 +2985,894 @@
         </p:nvGrpSpPr>
         <p:grpSpPr>
           <a:xfrm>
-            <a:off x="7832079" y="481974"/>
-            <a:ext cx="665805" cy="17058907"/>
-            <a:chOff x="7512037" y="1939035"/>
-            <a:chExt cx="665805" cy="17058907"/>
+            <a:off x="731306" y="879175"/>
+            <a:ext cx="12993779" cy="21667324"/>
+            <a:chOff x="731304" y="499127"/>
+            <a:chExt cx="12993779" cy="21667324"/>
           </a:xfrm>
         </p:grpSpPr>
-        <p:cxnSp>
-          <p:nvCxnSpPr>
-            <p:cNvPr id="40" name="Straight Arrow Connector 39">
+        <p:sp>
+          <p:nvSpPr>
+            <p:cNvPr id="4" name="Rectangle 3">
               <a:extLst>
                 <a:ext uri="{FF2B5EF4-FFF2-40B4-BE49-F238E27FC236}">
-                  <a16:creationId xmlns:a16="http://schemas.microsoft.com/office/drawing/2014/main" id="{2BD4EE66-03CD-57AB-7B61-237E16BF47BA}"/>
+                  <a16:creationId xmlns:a16="http://schemas.microsoft.com/office/drawing/2014/main" id="{28A8A818-C2BB-5E2A-FB9E-2D206A4281E9}"/>
                 </a:ext>
               </a:extLst>
             </p:cNvPr>
-            <p:cNvCxnSpPr>
-              <a:cxnSpLocks/>
-            </p:cNvCxnSpPr>
+            <p:cNvSpPr/>
             <p:nvPr/>
-          </p:nvCxnSpPr>
+          </p:nvSpPr>
           <p:spPr>
-            <a:xfrm flipH="1">
-              <a:off x="7512037" y="1939035"/>
-              <a:ext cx="17253" cy="17058907"/>
+            <a:xfrm>
+              <a:off x="1936162" y="499129"/>
+              <a:ext cx="5050972" cy="3669475"/>
             </a:xfrm>
-            <a:prstGeom prst="straightConnector1">
+            <a:prstGeom prst="rect">
               <a:avLst/>
             </a:prstGeom>
-            <a:ln w="38100">
-              <a:solidFill>
-                <a:schemeClr val="tx1"/>
-              </a:solidFill>
-              <a:headEnd w="lg" len="med"/>
-              <a:tailEnd type="triangle" w="lg" len="lg"/>
-            </a:ln>
-          </p:spPr>
-          <p:style>
-            <a:lnRef idx="1">
-              <a:schemeClr val="accent1"/>
-            </a:lnRef>
-            <a:fillRef idx="0">
-              <a:schemeClr val="accent1"/>
-            </a:fillRef>
-            <a:effectRef idx="0">
-              <a:schemeClr val="accent1"/>
-            </a:effectRef>
-            <a:fontRef idx="minor">
-              <a:schemeClr val="tx1"/>
-            </a:fontRef>
-          </p:style>
-        </p:cxnSp>
-        <p:cxnSp>
-          <p:nvCxnSpPr>
-            <p:cNvPr id="42" name="Straight Connector 41">
-              <a:extLst>
-                <a:ext uri="{FF2B5EF4-FFF2-40B4-BE49-F238E27FC236}">
-                  <a16:creationId xmlns:a16="http://schemas.microsoft.com/office/drawing/2014/main" id="{C3014057-CC87-762D-CFA9-41BCB65B052C}"/>
-                </a:ext>
-              </a:extLst>
-            </p:cNvPr>
-            <p:cNvCxnSpPr/>
-            <p:nvPr/>
-          </p:nvCxnSpPr>
-          <p:spPr>
-            <a:xfrm>
-              <a:off x="7512037" y="1939035"/>
-              <a:ext cx="648552" cy="0"/>
-            </a:xfrm>
-            <a:prstGeom prst="line">
-              <a:avLst/>
-            </a:prstGeom>
+            <a:noFill/>
             <a:ln w="38100">
               <a:solidFill>
                 <a:schemeClr val="tx1"/>
               </a:solidFill>
             </a:ln>
+            <a:effectLst/>
           </p:spPr>
           <p:style>
-            <a:lnRef idx="1">
-              <a:schemeClr val="accent1"/>
+            <a:lnRef idx="2">
+              <a:schemeClr val="accent1">
+                <a:shade val="50000"/>
+              </a:schemeClr>
             </a:lnRef>
-            <a:fillRef idx="0">
+            <a:fillRef idx="1">
               <a:schemeClr val="accent1"/>
             </a:fillRef>
             <a:effectRef idx="0">
               <a:schemeClr val="accent1"/>
             </a:effectRef>
             <a:fontRef idx="minor">
-              <a:schemeClr val="tx1"/>
+              <a:schemeClr val="lt1"/>
             </a:fontRef>
           </p:style>
-        </p:cxnSp>
-        <p:cxnSp>
-          <p:nvCxnSpPr>
-            <p:cNvPr id="43" name="Straight Connector 42">
+          <p:txBody>
+            <a:bodyPr rtlCol="0" anchor="ctr"/>
+            <a:lstStyle/>
+            <a:p>
+              <a:pPr algn="ctr"/>
+              <a:r>
+                <a:rPr lang="en-BE" sz="5200" dirty="0">
+                  <a:solidFill>
+                    <a:schemeClr val="tx1"/>
+                  </a:solidFill>
+                </a:rPr>
+                <a:t>Press the space bar to start a </a:t>
+              </a:r>
+              <a:r>
+                <a:rPr lang="en-BE" sz="5200" b="1" dirty="0">
+                  <a:solidFill>
+                    <a:schemeClr val="tx1"/>
+                  </a:solidFill>
+                </a:rPr>
+                <a:t>guess</a:t>
+              </a:r>
+              <a:r>
+                <a:rPr lang="en-BE" sz="5200" dirty="0">
+                  <a:solidFill>
+                    <a:schemeClr val="tx1"/>
+                  </a:solidFill>
+                </a:rPr>
+                <a:t> game.</a:t>
+              </a:r>
+            </a:p>
+          </p:txBody>
+        </p:sp>
+        <p:sp>
+          <p:nvSpPr>
+            <p:cNvPr id="16" name="Rectangle 15">
               <a:extLst>
                 <a:ext uri="{FF2B5EF4-FFF2-40B4-BE49-F238E27FC236}">
-                  <a16:creationId xmlns:a16="http://schemas.microsoft.com/office/drawing/2014/main" id="{F09FBC31-B5C1-6B50-4160-8CEF48BA6217}"/>
+                  <a16:creationId xmlns:a16="http://schemas.microsoft.com/office/drawing/2014/main" id="{330E4BD8-4C22-8BB6-9681-79CF15BE71EF}"/>
                 </a:ext>
               </a:extLst>
             </p:cNvPr>
-            <p:cNvCxnSpPr/>
+            <p:cNvSpPr/>
             <p:nvPr/>
-          </p:nvCxnSpPr>
+          </p:nvSpPr>
           <p:spPr>
             <a:xfrm>
-              <a:off x="7512037" y="5608510"/>
-              <a:ext cx="648552" cy="0"/>
+              <a:off x="1964254" y="18479578"/>
+              <a:ext cx="5050972" cy="3669475"/>
             </a:xfrm>
-            <a:prstGeom prst="line">
+            <a:prstGeom prst="rect">
               <a:avLst/>
             </a:prstGeom>
+            <a:noFill/>
             <a:ln w="38100">
               <a:solidFill>
                 <a:schemeClr val="tx1"/>
               </a:solidFill>
             </a:ln>
+            <a:effectLst/>
           </p:spPr>
           <p:style>
-            <a:lnRef idx="1">
-              <a:schemeClr val="accent1"/>
+            <a:lnRef idx="2">
+              <a:schemeClr val="accent1">
+                <a:shade val="50000"/>
+              </a:schemeClr>
             </a:lnRef>
-            <a:fillRef idx="0">
+            <a:fillRef idx="1">
               <a:schemeClr val="accent1"/>
             </a:fillRef>
             <a:effectRef idx="0">
               <a:schemeClr val="accent1"/>
             </a:effectRef>
             <a:fontRef idx="minor">
-              <a:schemeClr val="tx1"/>
+              <a:schemeClr val="lt1"/>
             </a:fontRef>
           </p:style>
-        </p:cxnSp>
-        <p:cxnSp>
-          <p:nvCxnSpPr>
-            <p:cNvPr id="44" name="Straight Connector 43">
+          <p:txBody>
+            <a:bodyPr rtlCol="0" anchor="ctr"/>
+            <a:lstStyle/>
+            <a:p>
+              <a:pPr algn="ctr"/>
+              <a:r>
+                <a:rPr lang="en-BE" sz="5200" dirty="0">
+                  <a:solidFill>
+                    <a:schemeClr val="tx1"/>
+                  </a:solidFill>
+                </a:rPr>
+                <a:t>Loading the game… </a:t>
+              </a:r>
+            </a:p>
+          </p:txBody>
+        </p:sp>
+        <p:sp>
+          <p:nvSpPr>
+            <p:cNvPr id="17" name="Rectangle 16">
               <a:extLst>
                 <a:ext uri="{FF2B5EF4-FFF2-40B4-BE49-F238E27FC236}">
-                  <a16:creationId xmlns:a16="http://schemas.microsoft.com/office/drawing/2014/main" id="{A5B6DD0B-C569-168C-372A-C28E8BD34519}"/>
+                  <a16:creationId xmlns:a16="http://schemas.microsoft.com/office/drawing/2014/main" id="{C8670502-8E25-3617-5AEB-D13990C98A79}"/>
                 </a:ext>
               </a:extLst>
             </p:cNvPr>
-            <p:cNvCxnSpPr/>
+            <p:cNvSpPr/>
             <p:nvPr/>
-          </p:nvCxnSpPr>
+          </p:nvSpPr>
           <p:spPr>
             <a:xfrm>
-              <a:off x="7512037" y="6402179"/>
-              <a:ext cx="648552" cy="0"/>
+              <a:off x="8674111" y="516867"/>
+              <a:ext cx="5050972" cy="3669475"/>
             </a:xfrm>
-            <a:prstGeom prst="line">
+            <a:prstGeom prst="rect">
               <a:avLst/>
             </a:prstGeom>
+            <a:noFill/>
             <a:ln w="38100">
               <a:solidFill>
                 <a:schemeClr val="tx1"/>
               </a:solidFill>
             </a:ln>
+            <a:effectLst/>
           </p:spPr>
           <p:style>
-            <a:lnRef idx="1">
-              <a:schemeClr val="accent1"/>
+            <a:lnRef idx="2">
+              <a:schemeClr val="accent1">
+                <a:shade val="50000"/>
+              </a:schemeClr>
             </a:lnRef>
-            <a:fillRef idx="0">
+            <a:fillRef idx="1">
               <a:schemeClr val="accent1"/>
             </a:fillRef>
             <a:effectRef idx="0">
               <a:schemeClr val="accent1"/>
             </a:effectRef>
             <a:fontRef idx="minor">
-              <a:schemeClr val="tx1"/>
+              <a:schemeClr val="lt1"/>
             </a:fontRef>
           </p:style>
-        </p:cxnSp>
-        <p:cxnSp>
-          <p:nvCxnSpPr>
-            <p:cNvPr id="45" name="Straight Connector 44">
+          <p:txBody>
+            <a:bodyPr rtlCol="0" anchor="ctr"/>
+            <a:lstStyle/>
+            <a:p>
+              <a:pPr algn="ctr"/>
+              <a:r>
+                <a:rPr lang="en-BE" sz="5200" dirty="0">
+                  <a:solidFill>
+                    <a:schemeClr val="tx1"/>
+                  </a:solidFill>
+                </a:rPr>
+                <a:t>Press the space bar to start a </a:t>
+              </a:r>
+              <a:r>
+                <a:rPr lang="en-BE" sz="5200" b="1" dirty="0">
+                  <a:solidFill>
+                    <a:schemeClr val="tx1"/>
+                  </a:solidFill>
+                </a:rPr>
+                <a:t>choice</a:t>
+              </a:r>
+              <a:r>
+                <a:rPr lang="en-BE" sz="5200" dirty="0">
+                  <a:solidFill>
+                    <a:schemeClr val="tx1"/>
+                  </a:solidFill>
+                </a:rPr>
+                <a:t> game.</a:t>
+              </a:r>
+            </a:p>
+            <a:p>
+              <a:pPr algn="ctr"/>
+              <a:endParaRPr lang="en-BE" dirty="0"/>
+            </a:p>
+          </p:txBody>
+        </p:sp>
+        <p:sp>
+          <p:nvSpPr>
+            <p:cNvPr id="18" name="Rectangle 17">
               <a:extLst>
                 <a:ext uri="{FF2B5EF4-FFF2-40B4-BE49-F238E27FC236}">
-                  <a16:creationId xmlns:a16="http://schemas.microsoft.com/office/drawing/2014/main" id="{E31209A0-F29C-EA43-1BE5-9B24B9BA18E8}"/>
+                  <a16:creationId xmlns:a16="http://schemas.microsoft.com/office/drawing/2014/main" id="{962FDB0B-5465-478C-0625-E98E34D750FD}"/>
                 </a:ext>
               </a:extLst>
             </p:cNvPr>
-            <p:cNvCxnSpPr/>
+            <p:cNvSpPr/>
             <p:nvPr/>
-          </p:nvCxnSpPr>
+          </p:nvSpPr>
           <p:spPr>
             <a:xfrm>
-              <a:off x="7512037" y="10071654"/>
-              <a:ext cx="648552" cy="0"/>
+              <a:off x="8674111" y="4980011"/>
+              <a:ext cx="5050972" cy="3669475"/>
             </a:xfrm>
-            <a:prstGeom prst="line">
+            <a:prstGeom prst="rect">
               <a:avLst/>
             </a:prstGeom>
+            <a:noFill/>
             <a:ln w="38100">
               <a:solidFill>
                 <a:schemeClr val="tx1"/>
               </a:solidFill>
             </a:ln>
+            <a:effectLst/>
           </p:spPr>
           <p:style>
-            <a:lnRef idx="1">
-              <a:schemeClr val="accent1"/>
+            <a:lnRef idx="2">
+              <a:schemeClr val="accent1">
+                <a:shade val="50000"/>
+              </a:schemeClr>
             </a:lnRef>
-            <a:fillRef idx="0">
+            <a:fillRef idx="1">
               <a:schemeClr val="accent1"/>
             </a:fillRef>
             <a:effectRef idx="0">
               <a:schemeClr val="accent1"/>
             </a:effectRef>
             <a:fontRef idx="minor">
-              <a:schemeClr val="tx1"/>
+              <a:schemeClr val="lt1"/>
             </a:fontRef>
           </p:style>
-        </p:cxnSp>
-        <p:cxnSp>
-          <p:nvCxnSpPr>
-            <p:cNvPr id="46" name="Straight Connector 45">
+          <p:txBody>
+            <a:bodyPr rtlCol="0" anchor="ctr"/>
+            <a:lstStyle/>
+            <a:p>
+              <a:pPr algn="ctr"/>
+              <a:endParaRPr lang="en-BE"/>
+            </a:p>
+          </p:txBody>
+        </p:sp>
+        <p:sp>
+          <p:nvSpPr>
+            <p:cNvPr id="19" name="Rectangle 18">
               <a:extLst>
                 <a:ext uri="{FF2B5EF4-FFF2-40B4-BE49-F238E27FC236}">
-                  <a16:creationId xmlns:a16="http://schemas.microsoft.com/office/drawing/2014/main" id="{043695CC-F99F-D50C-64F9-B3FAF5B8CFD4}"/>
+                  <a16:creationId xmlns:a16="http://schemas.microsoft.com/office/drawing/2014/main" id="{4C6BE0B4-CF05-898D-B738-EE523C5DAC54}"/>
                 </a:ext>
               </a:extLst>
             </p:cNvPr>
-            <p:cNvCxnSpPr/>
+            <p:cNvSpPr/>
             <p:nvPr/>
-          </p:nvCxnSpPr>
+          </p:nvSpPr>
           <p:spPr>
             <a:xfrm>
-              <a:off x="7512037" y="10865323"/>
-              <a:ext cx="648552" cy="0"/>
+              <a:off x="8674111" y="18489842"/>
+              <a:ext cx="5050972" cy="3669475"/>
             </a:xfrm>
-            <a:prstGeom prst="line">
+            <a:prstGeom prst="rect">
               <a:avLst/>
             </a:prstGeom>
+            <a:noFill/>
             <a:ln w="38100">
               <a:solidFill>
                 <a:schemeClr val="tx1"/>
               </a:solidFill>
             </a:ln>
+            <a:effectLst/>
           </p:spPr>
           <p:style>
-            <a:lnRef idx="1">
-              <a:schemeClr val="accent1"/>
+            <a:lnRef idx="2">
+              <a:schemeClr val="accent1">
+                <a:shade val="50000"/>
+              </a:schemeClr>
             </a:lnRef>
-            <a:fillRef idx="0">
+            <a:fillRef idx="1">
               <a:schemeClr val="accent1"/>
             </a:fillRef>
             <a:effectRef idx="0">
               <a:schemeClr val="accent1"/>
             </a:effectRef>
             <a:fontRef idx="minor">
-              <a:schemeClr val="tx1"/>
+              <a:schemeClr val="lt1"/>
             </a:fontRef>
           </p:style>
-        </p:cxnSp>
-        <p:cxnSp>
-          <p:nvCxnSpPr>
-            <p:cNvPr id="47" name="Straight Connector 46">
+          <p:txBody>
+            <a:bodyPr rtlCol="0" anchor="ctr"/>
+            <a:lstStyle/>
+            <a:p>
+              <a:pPr algn="ctr"/>
+              <a:endParaRPr lang="en-BE"/>
+            </a:p>
+          </p:txBody>
+        </p:sp>
+        <p:sp>
+          <p:nvSpPr>
+            <p:cNvPr id="20" name="Rectangle 19">
               <a:extLst>
                 <a:ext uri="{FF2B5EF4-FFF2-40B4-BE49-F238E27FC236}">
-                  <a16:creationId xmlns:a16="http://schemas.microsoft.com/office/drawing/2014/main" id="{9A5E6B76-6978-B8F5-E25F-3D02B400549D}"/>
+                  <a16:creationId xmlns:a16="http://schemas.microsoft.com/office/drawing/2014/main" id="{4EB70585-B073-8732-3CB0-EB476F043690}"/>
                 </a:ext>
               </a:extLst>
             </p:cNvPr>
-            <p:cNvCxnSpPr/>
+            <p:cNvSpPr/>
             <p:nvPr/>
-          </p:nvCxnSpPr>
+          </p:nvSpPr>
           <p:spPr>
             <a:xfrm>
-              <a:off x="7512037" y="14534798"/>
-              <a:ext cx="648552" cy="0"/>
+              <a:off x="1936160" y="4962273"/>
+              <a:ext cx="5050972" cy="3669475"/>
             </a:xfrm>
-            <a:prstGeom prst="line">
+            <a:prstGeom prst="rect">
               <a:avLst/>
             </a:prstGeom>
+            <a:noFill/>
             <a:ln w="38100">
               <a:solidFill>
                 <a:schemeClr val="tx1"/>
               </a:solidFill>
             </a:ln>
+            <a:effectLst/>
           </p:spPr>
           <p:style>
-            <a:lnRef idx="1">
-              <a:schemeClr val="accent1"/>
+            <a:lnRef idx="2">
+              <a:schemeClr val="accent1">
+                <a:shade val="50000"/>
+              </a:schemeClr>
             </a:lnRef>
-            <a:fillRef idx="0">
+            <a:fillRef idx="1">
               <a:schemeClr val="accent1"/>
             </a:fillRef>
             <a:effectRef idx="0">
               <a:schemeClr val="accent1"/>
             </a:effectRef>
             <a:fontRef idx="minor">
-              <a:schemeClr val="tx1"/>
+              <a:schemeClr val="lt1"/>
             </a:fontRef>
           </p:style>
-        </p:cxnSp>
-        <p:cxnSp>
-          <p:nvCxnSpPr>
-            <p:cNvPr id="49" name="Straight Connector 48">
+          <p:txBody>
+            <a:bodyPr rtlCol="0" anchor="ctr"/>
+            <a:lstStyle/>
+            <a:p>
+              <a:pPr algn="ctr"/>
+              <a:endParaRPr lang="en-BE"/>
+            </a:p>
+          </p:txBody>
+        </p:sp>
+        <p:sp>
+          <p:nvSpPr>
+            <p:cNvPr id="21" name="Rectangle 20">
               <a:extLst>
                 <a:ext uri="{FF2B5EF4-FFF2-40B4-BE49-F238E27FC236}">
-                  <a16:creationId xmlns:a16="http://schemas.microsoft.com/office/drawing/2014/main" id="{FDD7B79D-45C1-5F27-D6E1-F22DFB9E3865}"/>
+                  <a16:creationId xmlns:a16="http://schemas.microsoft.com/office/drawing/2014/main" id="{079CE0F1-387A-DD06-AA18-13B314F3C109}"/>
                 </a:ext>
               </a:extLst>
             </p:cNvPr>
-            <p:cNvCxnSpPr/>
+            <p:cNvSpPr/>
             <p:nvPr/>
-          </p:nvCxnSpPr>
+          </p:nvSpPr>
           <p:spPr>
             <a:xfrm>
-              <a:off x="7529290" y="15328467"/>
-              <a:ext cx="648552" cy="0"/>
+              <a:off x="1936160" y="9425417"/>
+              <a:ext cx="5050972" cy="3669475"/>
             </a:xfrm>
-            <a:prstGeom prst="line">
+            <a:prstGeom prst="rect">
               <a:avLst/>
             </a:prstGeom>
+            <a:noFill/>
             <a:ln w="38100">
               <a:solidFill>
                 <a:schemeClr val="tx1"/>
               </a:solidFill>
             </a:ln>
+            <a:effectLst/>
           </p:spPr>
           <p:style>
-            <a:lnRef idx="1">
-              <a:schemeClr val="accent1"/>
+            <a:lnRef idx="2">
+              <a:schemeClr val="accent1">
+                <a:shade val="50000"/>
+              </a:schemeClr>
             </a:lnRef>
-            <a:fillRef idx="0">
+            <a:fillRef idx="1">
               <a:schemeClr val="accent1"/>
             </a:fillRef>
             <a:effectRef idx="0">
               <a:schemeClr val="accent1"/>
             </a:effectRef>
             <a:fontRef idx="minor">
-              <a:schemeClr val="tx1"/>
+              <a:schemeClr val="lt1"/>
             </a:fontRef>
           </p:style>
-        </p:cxnSp>
-        <p:cxnSp>
-          <p:nvCxnSpPr>
-            <p:cNvPr id="50" name="Straight Connector 49">
+          <p:txBody>
+            <a:bodyPr rtlCol="0" anchor="ctr"/>
+            <a:lstStyle/>
+            <a:p>
+              <a:pPr algn="ctr"/>
+              <a:endParaRPr lang="en-BE"/>
+            </a:p>
+          </p:txBody>
+        </p:sp>
+        <p:pic>
+          <p:nvPicPr>
+            <p:cNvPr id="24" name="Picture 23" descr="A picture containing umbrella, accessory, stool, vector graphics&#10;&#10;Description automatically generated">
               <a:extLst>
                 <a:ext uri="{FF2B5EF4-FFF2-40B4-BE49-F238E27FC236}">
-                  <a16:creationId xmlns:a16="http://schemas.microsoft.com/office/drawing/2014/main" id="{E7B27165-AE43-E288-431D-3CD0DDE1B3B9}"/>
+                  <a16:creationId xmlns:a16="http://schemas.microsoft.com/office/drawing/2014/main" id="{CD512B21-4190-0839-BB0E-3C82064B5E1B}"/>
                 </a:ext>
               </a:extLst>
             </p:cNvPr>
-            <p:cNvCxnSpPr/>
+            <p:cNvPicPr>
+              <a:picLocks noChangeAspect="1"/>
+            </p:cNvPicPr>
             <p:nvPr/>
-          </p:nvCxnSpPr>
+          </p:nvPicPr>
+          <p:blipFill rotWithShape="1">
+            <a:blip r:embed="rId2"/>
+            <a:srcRect l="1648" r="2007"/>
+            <a:stretch/>
+          </p:blipFill>
           <p:spPr>
             <a:xfrm>
-              <a:off x="7529290" y="18997942"/>
-              <a:ext cx="648552" cy="0"/>
+              <a:off x="8754805" y="5250498"/>
+              <a:ext cx="4887317" cy="3128499"/>
             </a:xfrm>
-            <a:prstGeom prst="line">
+            <a:prstGeom prst="rect">
               <a:avLst/>
             </a:prstGeom>
-            <a:ln w="38100">
-              <a:solidFill>
-                <a:schemeClr val="tx1"/>
-              </a:solidFill>
+          </p:spPr>
+        </p:pic>
+        <p:pic>
+          <p:nvPicPr>
+            <p:cNvPr id="26" name="Picture 25" descr="A picture containing accessory, umbrella, vector graphics&#10;&#10;Description automatically generated">
+              <a:extLst>
+                <a:ext uri="{FF2B5EF4-FFF2-40B4-BE49-F238E27FC236}">
+                  <a16:creationId xmlns:a16="http://schemas.microsoft.com/office/drawing/2014/main" id="{67362C98-750E-DEC6-8C41-505ED72DD9E1}"/>
+                </a:ext>
+              </a:extLst>
+            </p:cNvPr>
+            <p:cNvPicPr>
+              <a:picLocks noChangeAspect="1"/>
+            </p:cNvPicPr>
+            <p:nvPr/>
+          </p:nvPicPr>
+          <p:blipFill rotWithShape="1">
+            <a:blip r:embed="rId3"/>
+            <a:srcRect t="5131" b="5426"/>
+            <a:stretch/>
+          </p:blipFill>
+          <p:spPr>
+            <a:xfrm>
+              <a:off x="9735068" y="18716978"/>
+              <a:ext cx="2926780" cy="3215201"/>
+            </a:xfrm>
+            <a:prstGeom prst="rect">
+              <a:avLst/>
+            </a:prstGeom>
+          </p:spPr>
+        </p:pic>
+        <p:pic>
+          <p:nvPicPr>
+            <p:cNvPr id="28" name="Picture 27" descr="Pie chart&#10;&#10;Description automatically generated with medium confidence">
+              <a:extLst>
+                <a:ext uri="{FF2B5EF4-FFF2-40B4-BE49-F238E27FC236}">
+                  <a16:creationId xmlns:a16="http://schemas.microsoft.com/office/drawing/2014/main" id="{8CEED8DE-B13B-1071-1FD7-E41B9424ED83}"/>
+                </a:ext>
+              </a:extLst>
+            </p:cNvPr>
+            <p:cNvPicPr>
+              <a:picLocks noChangeAspect="1"/>
+            </p:cNvPicPr>
+            <p:nvPr/>
+          </p:nvPicPr>
+          <p:blipFill>
+            <a:blip r:embed="rId4"/>
+            <a:stretch>
+              <a:fillRect/>
+            </a:stretch>
+          </p:blipFill>
+          <p:spPr>
+            <a:xfrm>
+              <a:off x="2420105" y="5041733"/>
+              <a:ext cx="4164267" cy="3456000"/>
+            </a:xfrm>
+            <a:prstGeom prst="rect">
+              <a:avLst/>
+            </a:prstGeom>
+          </p:spPr>
+        </p:pic>
+        <p:sp>
+          <p:nvSpPr>
+            <p:cNvPr id="33" name="Down Arrow 32">
+              <a:extLst>
+                <a:ext uri="{FF2B5EF4-FFF2-40B4-BE49-F238E27FC236}">
+                  <a16:creationId xmlns:a16="http://schemas.microsoft.com/office/drawing/2014/main" id="{4000978A-5568-523C-759B-AA0FFC699A59}"/>
+                </a:ext>
+              </a:extLst>
+            </p:cNvPr>
+            <p:cNvSpPr/>
+            <p:nvPr/>
+          </p:nvSpPr>
+          <p:spPr>
+            <a:xfrm>
+              <a:off x="4191645" y="4294196"/>
+              <a:ext cx="540000" cy="540000"/>
+            </a:xfrm>
+            <a:prstGeom prst="downArrow">
+              <a:avLst/>
+            </a:prstGeom>
+            <a:solidFill>
+              <a:schemeClr val="bg2">
+                <a:lumMod val="90000"/>
+              </a:schemeClr>
+            </a:solidFill>
+            <a:ln>
+              <a:noFill/>
             </a:ln>
           </p:spPr>
           <p:style>
-            <a:lnRef idx="1">
-              <a:schemeClr val="accent1"/>
+            <a:lnRef idx="2">
+              <a:schemeClr val="accent1">
+                <a:shade val="50000"/>
+              </a:schemeClr>
             </a:lnRef>
-            <a:fillRef idx="0">
+            <a:fillRef idx="1">
               <a:schemeClr val="accent1"/>
             </a:fillRef>
             <a:effectRef idx="0">
               <a:schemeClr val="accent1"/>
             </a:effectRef>
             <a:fontRef idx="minor">
-              <a:schemeClr val="tx1"/>
+              <a:schemeClr val="lt1"/>
             </a:fontRef>
           </p:style>
-        </p:cxnSp>
-      </p:grpSp>
-      <p:grpSp>
-        <p:nvGrpSpPr>
-          <p:cNvPr id="52" name="Group 51">
-            <a:extLst>
-              <a:ext uri="{FF2B5EF4-FFF2-40B4-BE49-F238E27FC236}">
-                <a16:creationId xmlns:a16="http://schemas.microsoft.com/office/drawing/2014/main" id="{D5B9D100-E4FA-DDE9-2D6E-C0710B5D7019}"/>
-              </a:ext>
-            </a:extLst>
-          </p:cNvPr>
-          <p:cNvGrpSpPr/>
-          <p:nvPr/>
-        </p:nvGrpSpPr>
-        <p:grpSpPr>
-          <a:xfrm>
-            <a:off x="719223" y="481974"/>
-            <a:ext cx="648552" cy="12595763"/>
-            <a:chOff x="7512037" y="1939035"/>
-            <a:chExt cx="648552" cy="12595763"/>
-          </a:xfrm>
-        </p:grpSpPr>
+          <p:txBody>
+            <a:bodyPr rtlCol="0" anchor="ctr"/>
+            <a:lstStyle/>
+            <a:p>
+              <a:pPr algn="ctr"/>
+              <a:endParaRPr lang="en-BE"/>
+            </a:p>
+          </p:txBody>
+        </p:sp>
+        <p:grpSp>
+          <p:nvGrpSpPr>
+            <p:cNvPr id="51" name="Group 50">
+              <a:extLst>
+                <a:ext uri="{FF2B5EF4-FFF2-40B4-BE49-F238E27FC236}">
+                  <a16:creationId xmlns:a16="http://schemas.microsoft.com/office/drawing/2014/main" id="{2D2B5409-8E21-973D-73CC-AA00E1068EE9}"/>
+                </a:ext>
+              </a:extLst>
+            </p:cNvPr>
+            <p:cNvGrpSpPr/>
+            <p:nvPr/>
+          </p:nvGrpSpPr>
+          <p:grpSpPr>
+            <a:xfrm>
+              <a:off x="7595415" y="516865"/>
+              <a:ext cx="699367" cy="21642452"/>
+              <a:chOff x="7461222" y="6402178"/>
+              <a:chExt cx="699367" cy="21642452"/>
+            </a:xfrm>
+          </p:grpSpPr>
+          <p:cxnSp>
+            <p:nvCxnSpPr>
+              <p:cNvPr id="40" name="Straight Arrow Connector 39">
+                <a:extLst>
+                  <a:ext uri="{FF2B5EF4-FFF2-40B4-BE49-F238E27FC236}">
+                    <a16:creationId xmlns:a16="http://schemas.microsoft.com/office/drawing/2014/main" id="{2BD4EE66-03CD-57AB-7B61-237E16BF47BA}"/>
+                  </a:ext>
+                </a:extLst>
+              </p:cNvPr>
+              <p:cNvCxnSpPr>
+                <a:cxnSpLocks/>
+              </p:cNvCxnSpPr>
+              <p:nvPr/>
+            </p:nvCxnSpPr>
+            <p:spPr>
+              <a:xfrm flipH="1">
+                <a:off x="7461222" y="6402178"/>
+                <a:ext cx="46499" cy="21642452"/>
+              </a:xfrm>
+              <a:prstGeom prst="straightConnector1">
+                <a:avLst/>
+              </a:prstGeom>
+              <a:ln w="38100">
+                <a:solidFill>
+                  <a:schemeClr val="tx1"/>
+                </a:solidFill>
+                <a:headEnd w="lg" len="med"/>
+                <a:tailEnd type="triangle" w="lg" len="lg"/>
+              </a:ln>
+            </p:spPr>
+            <p:style>
+              <a:lnRef idx="1">
+                <a:schemeClr val="accent1"/>
+              </a:lnRef>
+              <a:fillRef idx="0">
+                <a:schemeClr val="accent1"/>
+              </a:fillRef>
+              <a:effectRef idx="0">
+                <a:schemeClr val="accent1"/>
+              </a:effectRef>
+              <a:fontRef idx="minor">
+                <a:schemeClr val="tx1"/>
+              </a:fontRef>
+            </p:style>
+          </p:cxnSp>
+          <p:cxnSp>
+            <p:nvCxnSpPr>
+              <p:cNvPr id="44" name="Straight Connector 43">
+                <a:extLst>
+                  <a:ext uri="{FF2B5EF4-FFF2-40B4-BE49-F238E27FC236}">
+                    <a16:creationId xmlns:a16="http://schemas.microsoft.com/office/drawing/2014/main" id="{A5B6DD0B-C569-168C-372A-C28E8BD34519}"/>
+                  </a:ext>
+                </a:extLst>
+              </p:cNvPr>
+              <p:cNvCxnSpPr/>
+              <p:nvPr/>
+            </p:nvCxnSpPr>
+            <p:spPr>
+              <a:xfrm>
+                <a:off x="7512037" y="6402179"/>
+                <a:ext cx="648552" cy="0"/>
+              </a:xfrm>
+              <a:prstGeom prst="line">
+                <a:avLst/>
+              </a:prstGeom>
+              <a:ln w="38100">
+                <a:solidFill>
+                  <a:schemeClr val="tx1"/>
+                </a:solidFill>
+              </a:ln>
+            </p:spPr>
+            <p:style>
+              <a:lnRef idx="1">
+                <a:schemeClr val="accent1"/>
+              </a:lnRef>
+              <a:fillRef idx="0">
+                <a:schemeClr val="accent1"/>
+              </a:fillRef>
+              <a:effectRef idx="0">
+                <a:schemeClr val="accent1"/>
+              </a:effectRef>
+              <a:fontRef idx="minor">
+                <a:schemeClr val="tx1"/>
+              </a:fontRef>
+            </p:style>
+          </p:cxnSp>
+          <p:cxnSp>
+            <p:nvCxnSpPr>
+              <p:cNvPr id="45" name="Straight Connector 44">
+                <a:extLst>
+                  <a:ext uri="{FF2B5EF4-FFF2-40B4-BE49-F238E27FC236}">
+                    <a16:creationId xmlns:a16="http://schemas.microsoft.com/office/drawing/2014/main" id="{E31209A0-F29C-EA43-1BE5-9B24B9BA18E8}"/>
+                  </a:ext>
+                </a:extLst>
+              </p:cNvPr>
+              <p:cNvCxnSpPr/>
+              <p:nvPr/>
+            </p:nvCxnSpPr>
+            <p:spPr>
+              <a:xfrm>
+                <a:off x="7512037" y="10071654"/>
+                <a:ext cx="648552" cy="0"/>
+              </a:xfrm>
+              <a:prstGeom prst="line">
+                <a:avLst/>
+              </a:prstGeom>
+              <a:ln w="38100">
+                <a:solidFill>
+                  <a:schemeClr val="tx1"/>
+                </a:solidFill>
+              </a:ln>
+            </p:spPr>
+            <p:style>
+              <a:lnRef idx="1">
+                <a:schemeClr val="accent1"/>
+              </a:lnRef>
+              <a:fillRef idx="0">
+                <a:schemeClr val="accent1"/>
+              </a:fillRef>
+              <a:effectRef idx="0">
+                <a:schemeClr val="accent1"/>
+              </a:effectRef>
+              <a:fontRef idx="minor">
+                <a:schemeClr val="tx1"/>
+              </a:fontRef>
+            </p:style>
+          </p:cxnSp>
+          <p:cxnSp>
+            <p:nvCxnSpPr>
+              <p:cNvPr id="46" name="Straight Connector 45">
+                <a:extLst>
+                  <a:ext uri="{FF2B5EF4-FFF2-40B4-BE49-F238E27FC236}">
+                    <a16:creationId xmlns:a16="http://schemas.microsoft.com/office/drawing/2014/main" id="{043695CC-F99F-D50C-64F9-B3FAF5B8CFD4}"/>
+                  </a:ext>
+                </a:extLst>
+              </p:cNvPr>
+              <p:cNvCxnSpPr/>
+              <p:nvPr/>
+            </p:nvCxnSpPr>
+            <p:spPr>
+              <a:xfrm>
+                <a:off x="7512037" y="10865323"/>
+                <a:ext cx="648552" cy="0"/>
+              </a:xfrm>
+              <a:prstGeom prst="line">
+                <a:avLst/>
+              </a:prstGeom>
+              <a:ln w="38100">
+                <a:solidFill>
+                  <a:schemeClr val="tx1"/>
+                </a:solidFill>
+              </a:ln>
+            </p:spPr>
+            <p:style>
+              <a:lnRef idx="1">
+                <a:schemeClr val="accent1"/>
+              </a:lnRef>
+              <a:fillRef idx="0">
+                <a:schemeClr val="accent1"/>
+              </a:fillRef>
+              <a:effectRef idx="0">
+                <a:schemeClr val="accent1"/>
+              </a:effectRef>
+              <a:fontRef idx="minor">
+                <a:schemeClr val="tx1"/>
+              </a:fontRef>
+            </p:style>
+          </p:cxnSp>
+          <p:cxnSp>
+            <p:nvCxnSpPr>
+              <p:cNvPr id="47" name="Straight Connector 46">
+                <a:extLst>
+                  <a:ext uri="{FF2B5EF4-FFF2-40B4-BE49-F238E27FC236}">
+                    <a16:creationId xmlns:a16="http://schemas.microsoft.com/office/drawing/2014/main" id="{9A5E6B76-6978-B8F5-E25F-3D02B400549D}"/>
+                  </a:ext>
+                </a:extLst>
+              </p:cNvPr>
+              <p:cNvCxnSpPr/>
+              <p:nvPr/>
+            </p:nvCxnSpPr>
+            <p:spPr>
+              <a:xfrm>
+                <a:off x="7512037" y="14534798"/>
+                <a:ext cx="648552" cy="0"/>
+              </a:xfrm>
+              <a:prstGeom prst="line">
+                <a:avLst/>
+              </a:prstGeom>
+              <a:ln w="38100">
+                <a:solidFill>
+                  <a:schemeClr val="tx1"/>
+                </a:solidFill>
+              </a:ln>
+            </p:spPr>
+            <p:style>
+              <a:lnRef idx="1">
+                <a:schemeClr val="accent1"/>
+              </a:lnRef>
+              <a:fillRef idx="0">
+                <a:schemeClr val="accent1"/>
+              </a:fillRef>
+              <a:effectRef idx="0">
+                <a:schemeClr val="accent1"/>
+              </a:effectRef>
+              <a:fontRef idx="minor">
+                <a:schemeClr val="tx1"/>
+              </a:fontRef>
+            </p:style>
+          </p:cxnSp>
+          <p:cxnSp>
+            <p:nvCxnSpPr>
+              <p:cNvPr id="49" name="Straight Connector 48">
+                <a:extLst>
+                  <a:ext uri="{FF2B5EF4-FFF2-40B4-BE49-F238E27FC236}">
+                    <a16:creationId xmlns:a16="http://schemas.microsoft.com/office/drawing/2014/main" id="{FDD7B79D-45C1-5F27-D6E1-F22DFB9E3865}"/>
+                  </a:ext>
+                </a:extLst>
+              </p:cNvPr>
+              <p:cNvCxnSpPr/>
+              <p:nvPr/>
+            </p:nvCxnSpPr>
+            <p:spPr>
+              <a:xfrm>
+                <a:off x="7505844" y="15328467"/>
+                <a:ext cx="648552" cy="0"/>
+              </a:xfrm>
+              <a:prstGeom prst="line">
+                <a:avLst/>
+              </a:prstGeom>
+              <a:ln w="38100">
+                <a:solidFill>
+                  <a:schemeClr val="tx1"/>
+                </a:solidFill>
+              </a:ln>
+            </p:spPr>
+            <p:style>
+              <a:lnRef idx="1">
+                <a:schemeClr val="accent1"/>
+              </a:lnRef>
+              <a:fillRef idx="0">
+                <a:schemeClr val="accent1"/>
+              </a:fillRef>
+              <a:effectRef idx="0">
+                <a:schemeClr val="accent1"/>
+              </a:effectRef>
+              <a:fontRef idx="minor">
+                <a:schemeClr val="tx1"/>
+              </a:fontRef>
+            </p:style>
+          </p:cxnSp>
+          <p:cxnSp>
+            <p:nvCxnSpPr>
+              <p:cNvPr id="50" name="Straight Connector 49">
+                <a:extLst>
+                  <a:ext uri="{FF2B5EF4-FFF2-40B4-BE49-F238E27FC236}">
+                    <a16:creationId xmlns:a16="http://schemas.microsoft.com/office/drawing/2014/main" id="{E7B27165-AE43-E288-431D-3CD0DDE1B3B9}"/>
+                  </a:ext>
+                </a:extLst>
+              </p:cNvPr>
+              <p:cNvCxnSpPr/>
+              <p:nvPr/>
+            </p:nvCxnSpPr>
+            <p:spPr>
+              <a:xfrm>
+                <a:off x="7505844" y="18997942"/>
+                <a:ext cx="648552" cy="0"/>
+              </a:xfrm>
+              <a:prstGeom prst="line">
+                <a:avLst/>
+              </a:prstGeom>
+              <a:ln w="38100">
+                <a:solidFill>
+                  <a:schemeClr val="tx1"/>
+                </a:solidFill>
+              </a:ln>
+            </p:spPr>
+            <p:style>
+              <a:lnRef idx="1">
+                <a:schemeClr val="accent1"/>
+              </a:lnRef>
+              <a:fillRef idx="0">
+                <a:schemeClr val="accent1"/>
+              </a:fillRef>
+              <a:effectRef idx="0">
+                <a:schemeClr val="accent1"/>
+              </a:effectRef>
+              <a:fontRef idx="minor">
+                <a:schemeClr val="tx1"/>
+              </a:fontRef>
+            </p:style>
+          </p:cxnSp>
+        </p:grpSp>
         <p:cxnSp>
           <p:nvCxnSpPr>
             <p:cNvPr id="53" name="Straight Arrow Connector 52">
@@ -4000,9 +3888,9 @@
             <p:nvPr/>
           </p:nvCxnSpPr>
           <p:spPr>
-            <a:xfrm>
-              <a:off x="7529290" y="1939035"/>
-              <a:ext cx="0" cy="12595763"/>
+            <a:xfrm flipH="1">
+              <a:off x="784843" y="499127"/>
+              <a:ext cx="8627" cy="21649926"/>
             </a:xfrm>
             <a:prstGeom prst="straightConnector1">
               <a:avLst/>
@@ -4044,7 +3932,7 @@
           </p:nvCxnSpPr>
           <p:spPr>
             <a:xfrm>
-              <a:off x="7512037" y="1939035"/>
+              <a:off x="776217" y="499127"/>
               <a:ext cx="648552" cy="0"/>
             </a:xfrm>
             <a:prstGeom prst="line">
@@ -4085,7 +3973,7 @@
           </p:nvCxnSpPr>
           <p:spPr>
             <a:xfrm>
-              <a:off x="7512037" y="5608510"/>
+              <a:off x="776217" y="4168602"/>
               <a:ext cx="648552" cy="0"/>
             </a:xfrm>
             <a:prstGeom prst="line">
@@ -4126,7 +4014,7 @@
           </p:nvCxnSpPr>
           <p:spPr>
             <a:xfrm>
-              <a:off x="7512037" y="6402179"/>
+              <a:off x="776217" y="4962271"/>
               <a:ext cx="648552" cy="0"/>
             </a:xfrm>
             <a:prstGeom prst="line">
@@ -4167,7 +4055,7 @@
           </p:nvCxnSpPr>
           <p:spPr>
             <a:xfrm>
-              <a:off x="7512037" y="10071654"/>
+              <a:off x="776217" y="8631746"/>
               <a:ext cx="648552" cy="0"/>
             </a:xfrm>
             <a:prstGeom prst="line">
@@ -4208,7 +4096,7 @@
           </p:nvCxnSpPr>
           <p:spPr>
             <a:xfrm>
-              <a:off x="7512037" y="10865323"/>
+              <a:off x="776217" y="9425415"/>
               <a:ext cx="648552" cy="0"/>
             </a:xfrm>
             <a:prstGeom prst="line">
@@ -4249,7 +4137,7 @@
           </p:nvCxnSpPr>
           <p:spPr>
             <a:xfrm>
-              <a:off x="7512037" y="14534798"/>
+              <a:off x="776217" y="13094890"/>
               <a:ext cx="648552" cy="0"/>
             </a:xfrm>
             <a:prstGeom prst="line">
@@ -4276,475 +4164,1316 @@
             </a:fontRef>
           </p:style>
         </p:cxnSp>
+        <p:sp>
+          <p:nvSpPr>
+            <p:cNvPr id="65" name="TextBox 64">
+              <a:extLst>
+                <a:ext uri="{FF2B5EF4-FFF2-40B4-BE49-F238E27FC236}">
+                  <a16:creationId xmlns:a16="http://schemas.microsoft.com/office/drawing/2014/main" id="{C5072EF2-8371-FB4C-1255-8D42F1D0107C}"/>
+                </a:ext>
+              </a:extLst>
+            </p:cNvPr>
+            <p:cNvSpPr txBox="1"/>
+            <p:nvPr/>
+          </p:nvSpPr>
+          <p:spPr>
+            <a:xfrm rot="5400000">
+              <a:off x="-369328" y="1949146"/>
+              <a:ext cx="3077783" cy="769441"/>
+            </a:xfrm>
+            <a:prstGeom prst="rect">
+              <a:avLst/>
+            </a:prstGeom>
+            <a:noFill/>
+          </p:spPr>
+          <p:txBody>
+            <a:bodyPr wrap="square" rtlCol="0">
+              <a:spAutoFit/>
+            </a:bodyPr>
+            <a:lstStyle/>
+            <a:p>
+              <a:pPr algn="ctr"/>
+              <a:r>
+                <a:rPr lang="en-BE" sz="4400" dirty="0"/>
+                <a:t>Self-Paced</a:t>
+              </a:r>
+            </a:p>
+          </p:txBody>
+        </p:sp>
+        <p:sp>
+          <p:nvSpPr>
+            <p:cNvPr id="66" name="TextBox 65">
+              <a:extLst>
+                <a:ext uri="{FF2B5EF4-FFF2-40B4-BE49-F238E27FC236}">
+                  <a16:creationId xmlns:a16="http://schemas.microsoft.com/office/drawing/2014/main" id="{3BE0496A-49B1-3B6B-518C-DB03975D28AD}"/>
+                </a:ext>
+              </a:extLst>
+            </p:cNvPr>
+            <p:cNvSpPr txBox="1"/>
+            <p:nvPr/>
+          </p:nvSpPr>
+          <p:spPr>
+            <a:xfrm rot="5400000">
+              <a:off x="-397363" y="6447394"/>
+              <a:ext cx="3077783" cy="769441"/>
+            </a:xfrm>
+            <a:prstGeom prst="rect">
+              <a:avLst/>
+            </a:prstGeom>
+            <a:noFill/>
+          </p:spPr>
+          <p:txBody>
+            <a:bodyPr wrap="square" rtlCol="0">
+              <a:spAutoFit/>
+            </a:bodyPr>
+            <a:lstStyle/>
+            <a:p>
+              <a:pPr algn="ctr"/>
+              <a:r>
+                <a:rPr lang="en-BE" sz="4400" dirty="0"/>
+                <a:t>Self-Paced</a:t>
+              </a:r>
+            </a:p>
+          </p:txBody>
+        </p:sp>
+        <p:sp>
+          <p:nvSpPr>
+            <p:cNvPr id="67" name="TextBox 66">
+              <a:extLst>
+                <a:ext uri="{FF2B5EF4-FFF2-40B4-BE49-F238E27FC236}">
+                  <a16:creationId xmlns:a16="http://schemas.microsoft.com/office/drawing/2014/main" id="{15C5F534-A368-CB9B-A8A2-2E29D323087C}"/>
+                </a:ext>
+              </a:extLst>
+            </p:cNvPr>
+            <p:cNvSpPr txBox="1"/>
+            <p:nvPr/>
+          </p:nvSpPr>
+          <p:spPr>
+            <a:xfrm rot="5400000">
+              <a:off x="-422867" y="10900791"/>
+              <a:ext cx="3077783" cy="769441"/>
+            </a:xfrm>
+            <a:prstGeom prst="rect">
+              <a:avLst/>
+            </a:prstGeom>
+            <a:noFill/>
+          </p:spPr>
+          <p:txBody>
+            <a:bodyPr wrap="square" rtlCol="0">
+              <a:spAutoFit/>
+            </a:bodyPr>
+            <a:lstStyle/>
+            <a:p>
+              <a:pPr algn="ctr"/>
+              <a:r>
+                <a:rPr lang="en-BE" sz="4400" dirty="0"/>
+                <a:t>1500 ms</a:t>
+              </a:r>
+            </a:p>
+          </p:txBody>
+        </p:sp>
+        <p:sp>
+          <p:nvSpPr>
+            <p:cNvPr id="70" name="TextBox 69">
+              <a:extLst>
+                <a:ext uri="{FF2B5EF4-FFF2-40B4-BE49-F238E27FC236}">
+                  <a16:creationId xmlns:a16="http://schemas.microsoft.com/office/drawing/2014/main" id="{5FD4604A-A1EC-C5AB-258E-E2D09AB67B75}"/>
+                </a:ext>
+              </a:extLst>
+            </p:cNvPr>
+            <p:cNvSpPr txBox="1"/>
+            <p:nvPr/>
+          </p:nvSpPr>
+          <p:spPr>
+            <a:xfrm rot="5400000">
+              <a:off x="6235456" y="1966881"/>
+              <a:ext cx="3669470" cy="769441"/>
+            </a:xfrm>
+            <a:prstGeom prst="rect">
+              <a:avLst/>
+            </a:prstGeom>
+            <a:noFill/>
+          </p:spPr>
+          <p:txBody>
+            <a:bodyPr wrap="square" rtlCol="0">
+              <a:spAutoFit/>
+            </a:bodyPr>
+            <a:lstStyle/>
+            <a:p>
+              <a:pPr algn="ctr"/>
+              <a:r>
+                <a:rPr lang="en-BE" sz="4400" dirty="0"/>
+                <a:t>Self-Paced</a:t>
+              </a:r>
+            </a:p>
+          </p:txBody>
+        </p:sp>
+        <p:sp>
+          <p:nvSpPr>
+            <p:cNvPr id="71" name="TextBox 70">
+              <a:extLst>
+                <a:ext uri="{FF2B5EF4-FFF2-40B4-BE49-F238E27FC236}">
+                  <a16:creationId xmlns:a16="http://schemas.microsoft.com/office/drawing/2014/main" id="{9C3236FC-09C9-702E-8CE8-F60BA47B7C4B}"/>
+                </a:ext>
+              </a:extLst>
+            </p:cNvPr>
+            <p:cNvSpPr txBox="1"/>
+            <p:nvPr/>
+          </p:nvSpPr>
+          <p:spPr>
+            <a:xfrm rot="5400000">
+              <a:off x="6204837" y="6452461"/>
+              <a:ext cx="3669470" cy="769441"/>
+            </a:xfrm>
+            <a:prstGeom prst="rect">
+              <a:avLst/>
+            </a:prstGeom>
+            <a:noFill/>
+          </p:spPr>
+          <p:txBody>
+            <a:bodyPr wrap="square" rtlCol="0">
+              <a:spAutoFit/>
+            </a:bodyPr>
+            <a:lstStyle/>
+            <a:p>
+              <a:pPr algn="ctr"/>
+              <a:r>
+                <a:rPr lang="en-BE" sz="4400" dirty="0"/>
+                <a:t>Self-Paced</a:t>
+              </a:r>
+            </a:p>
+          </p:txBody>
+        </p:sp>
+        <p:sp>
+          <p:nvSpPr>
+            <p:cNvPr id="72" name="TextBox 71">
+              <a:extLst>
+                <a:ext uri="{FF2B5EF4-FFF2-40B4-BE49-F238E27FC236}">
+                  <a16:creationId xmlns:a16="http://schemas.microsoft.com/office/drawing/2014/main" id="{0430DE07-A4CC-6FD8-D784-A23D2A6639B7}"/>
+                </a:ext>
+              </a:extLst>
+            </p:cNvPr>
+            <p:cNvSpPr txBox="1"/>
+            <p:nvPr/>
+          </p:nvSpPr>
+          <p:spPr>
+            <a:xfrm rot="5400000">
+              <a:off x="6539693" y="10900791"/>
+              <a:ext cx="3077780" cy="769441"/>
+            </a:xfrm>
+            <a:prstGeom prst="rect">
+              <a:avLst/>
+            </a:prstGeom>
+            <a:noFill/>
+          </p:spPr>
+          <p:txBody>
+            <a:bodyPr wrap="square" rtlCol="0">
+              <a:spAutoFit/>
+            </a:bodyPr>
+            <a:lstStyle/>
+            <a:p>
+              <a:pPr algn="ctr"/>
+              <a:r>
+                <a:rPr lang="en-BE" sz="4400" dirty="0"/>
+                <a:t>500 ms</a:t>
+              </a:r>
+            </a:p>
+          </p:txBody>
+        </p:sp>
+        <p:sp>
+          <p:nvSpPr>
+            <p:cNvPr id="73" name="Down Arrow 72">
+              <a:extLst>
+                <a:ext uri="{FF2B5EF4-FFF2-40B4-BE49-F238E27FC236}">
+                  <a16:creationId xmlns:a16="http://schemas.microsoft.com/office/drawing/2014/main" id="{3D4E30E7-25EC-ACEC-4B41-197CAAA4591F}"/>
+                </a:ext>
+              </a:extLst>
+            </p:cNvPr>
+            <p:cNvSpPr/>
+            <p:nvPr/>
+          </p:nvSpPr>
+          <p:spPr>
+            <a:xfrm>
+              <a:off x="4191645" y="8744991"/>
+              <a:ext cx="540000" cy="540000"/>
+            </a:xfrm>
+            <a:prstGeom prst="downArrow">
+              <a:avLst/>
+            </a:prstGeom>
+            <a:solidFill>
+              <a:schemeClr val="bg2">
+                <a:lumMod val="90000"/>
+              </a:schemeClr>
+            </a:solidFill>
+            <a:ln>
+              <a:noFill/>
+            </a:ln>
+          </p:spPr>
+          <p:style>
+            <a:lnRef idx="2">
+              <a:schemeClr val="accent1">
+                <a:shade val="50000"/>
+              </a:schemeClr>
+            </a:lnRef>
+            <a:fillRef idx="1">
+              <a:schemeClr val="accent1"/>
+            </a:fillRef>
+            <a:effectRef idx="0">
+              <a:schemeClr val="accent1"/>
+            </a:effectRef>
+            <a:fontRef idx="minor">
+              <a:schemeClr val="lt1"/>
+            </a:fontRef>
+          </p:style>
+          <p:txBody>
+            <a:bodyPr rtlCol="0" anchor="ctr"/>
+            <a:lstStyle/>
+            <a:p>
+              <a:pPr algn="ctr"/>
+              <a:endParaRPr lang="en-BE"/>
+            </a:p>
+          </p:txBody>
+        </p:sp>
+        <p:sp>
+          <p:nvSpPr>
+            <p:cNvPr id="75" name="Down Arrow 74">
+              <a:extLst>
+                <a:ext uri="{FF2B5EF4-FFF2-40B4-BE49-F238E27FC236}">
+                  <a16:creationId xmlns:a16="http://schemas.microsoft.com/office/drawing/2014/main" id="{E0232A55-7107-96B2-675E-049800CEAE50}"/>
+                </a:ext>
+              </a:extLst>
+            </p:cNvPr>
+            <p:cNvSpPr/>
+            <p:nvPr/>
+          </p:nvSpPr>
+          <p:spPr>
+            <a:xfrm>
+              <a:off x="10928458" y="4299397"/>
+              <a:ext cx="540000" cy="540000"/>
+            </a:xfrm>
+            <a:prstGeom prst="downArrow">
+              <a:avLst/>
+            </a:prstGeom>
+            <a:solidFill>
+              <a:schemeClr val="bg2">
+                <a:lumMod val="90000"/>
+              </a:schemeClr>
+            </a:solidFill>
+            <a:ln>
+              <a:noFill/>
+            </a:ln>
+          </p:spPr>
+          <p:style>
+            <a:lnRef idx="2">
+              <a:schemeClr val="accent1">
+                <a:shade val="50000"/>
+              </a:schemeClr>
+            </a:lnRef>
+            <a:fillRef idx="1">
+              <a:schemeClr val="accent1"/>
+            </a:fillRef>
+            <a:effectRef idx="0">
+              <a:schemeClr val="accent1"/>
+            </a:effectRef>
+            <a:fontRef idx="minor">
+              <a:schemeClr val="lt1"/>
+            </a:fontRef>
+          </p:style>
+          <p:txBody>
+            <a:bodyPr rtlCol="0" anchor="ctr"/>
+            <a:lstStyle/>
+            <a:p>
+              <a:pPr algn="ctr"/>
+              <a:endParaRPr lang="en-BE"/>
+            </a:p>
+          </p:txBody>
+        </p:sp>
+        <p:sp>
+          <p:nvSpPr>
+            <p:cNvPr id="76" name="Down Arrow 75">
+              <a:extLst>
+                <a:ext uri="{FF2B5EF4-FFF2-40B4-BE49-F238E27FC236}">
+                  <a16:creationId xmlns:a16="http://schemas.microsoft.com/office/drawing/2014/main" id="{C4C4BB2B-9D29-5444-0DDF-EAE74D0F9A41}"/>
+                </a:ext>
+              </a:extLst>
+            </p:cNvPr>
+            <p:cNvSpPr/>
+            <p:nvPr/>
+          </p:nvSpPr>
+          <p:spPr>
+            <a:xfrm>
+              <a:off x="10928458" y="8758571"/>
+              <a:ext cx="540000" cy="540000"/>
+            </a:xfrm>
+            <a:prstGeom prst="downArrow">
+              <a:avLst/>
+            </a:prstGeom>
+            <a:solidFill>
+              <a:schemeClr val="bg2">
+                <a:lumMod val="90000"/>
+              </a:schemeClr>
+            </a:solidFill>
+            <a:ln>
+              <a:noFill/>
+            </a:ln>
+          </p:spPr>
+          <p:style>
+            <a:lnRef idx="2">
+              <a:schemeClr val="accent1">
+                <a:shade val="50000"/>
+              </a:schemeClr>
+            </a:lnRef>
+            <a:fillRef idx="1">
+              <a:schemeClr val="accent1"/>
+            </a:fillRef>
+            <a:effectRef idx="0">
+              <a:schemeClr val="accent1"/>
+            </a:effectRef>
+            <a:fontRef idx="minor">
+              <a:schemeClr val="lt1"/>
+            </a:fontRef>
+          </p:style>
+          <p:txBody>
+            <a:bodyPr rtlCol="0" anchor="ctr"/>
+            <a:lstStyle/>
+            <a:p>
+              <a:pPr algn="ctr"/>
+              <a:endParaRPr lang="en-BE"/>
+            </a:p>
+          </p:txBody>
+        </p:sp>
+        <p:sp>
+          <p:nvSpPr>
+            <p:cNvPr id="2" name="Rectangle 1">
+              <a:extLst>
+                <a:ext uri="{FF2B5EF4-FFF2-40B4-BE49-F238E27FC236}">
+                  <a16:creationId xmlns:a16="http://schemas.microsoft.com/office/drawing/2014/main" id="{A071DA36-3A34-D947-EBB6-730D4C10CDEB}"/>
+                </a:ext>
+              </a:extLst>
+            </p:cNvPr>
+            <p:cNvSpPr/>
+            <p:nvPr/>
+          </p:nvSpPr>
+          <p:spPr>
+            <a:xfrm>
+              <a:off x="1964254" y="13933426"/>
+              <a:ext cx="5050972" cy="3669475"/>
+            </a:xfrm>
+            <a:prstGeom prst="rect">
+              <a:avLst/>
+            </a:prstGeom>
+            <a:noFill/>
+            <a:ln w="38100">
+              <a:solidFill>
+                <a:schemeClr val="tx1"/>
+              </a:solidFill>
+            </a:ln>
+            <a:effectLst/>
+          </p:spPr>
+          <p:style>
+            <a:lnRef idx="2">
+              <a:schemeClr val="accent1">
+                <a:shade val="50000"/>
+              </a:schemeClr>
+            </a:lnRef>
+            <a:fillRef idx="1">
+              <a:schemeClr val="accent1"/>
+            </a:fillRef>
+            <a:effectRef idx="0">
+              <a:schemeClr val="accent1"/>
+            </a:effectRef>
+            <a:fontRef idx="minor">
+              <a:schemeClr val="lt1"/>
+            </a:fontRef>
+          </p:style>
+          <p:txBody>
+            <a:bodyPr rtlCol="0" anchor="ctr"/>
+            <a:lstStyle/>
+            <a:p>
+              <a:pPr algn="ctr"/>
+              <a:endParaRPr lang="en-BE"/>
+            </a:p>
+          </p:txBody>
+        </p:sp>
+        <p:pic>
+          <p:nvPicPr>
+            <p:cNvPr id="3" name="Picture 2" descr="A picture containing pie chart&#10;&#10;Description automatically generated">
+              <a:extLst>
+                <a:ext uri="{FF2B5EF4-FFF2-40B4-BE49-F238E27FC236}">
+                  <a16:creationId xmlns:a16="http://schemas.microsoft.com/office/drawing/2014/main" id="{628327CE-8B35-496C-A8D4-17A81B9A03A9}"/>
+                </a:ext>
+              </a:extLst>
+            </p:cNvPr>
+            <p:cNvPicPr>
+              <a:picLocks noChangeAspect="1"/>
+            </p:cNvPicPr>
+            <p:nvPr/>
+          </p:nvPicPr>
+          <p:blipFill>
+            <a:blip r:embed="rId5"/>
+            <a:stretch>
+              <a:fillRect/>
+            </a:stretch>
+          </p:blipFill>
+          <p:spPr>
+            <a:xfrm>
+              <a:off x="2328451" y="14095867"/>
+              <a:ext cx="4266388" cy="3441721"/>
+            </a:xfrm>
+            <a:prstGeom prst="rect">
+              <a:avLst/>
+            </a:prstGeom>
+          </p:spPr>
+        </p:pic>
+        <p:sp>
+          <p:nvSpPr>
+            <p:cNvPr id="5" name="Down Arrow 4">
+              <a:extLst>
+                <a:ext uri="{FF2B5EF4-FFF2-40B4-BE49-F238E27FC236}">
+                  <a16:creationId xmlns:a16="http://schemas.microsoft.com/office/drawing/2014/main" id="{3F70A995-353F-2C24-0EE2-8802ACE37A3B}"/>
+                </a:ext>
+              </a:extLst>
+            </p:cNvPr>
+            <p:cNvSpPr/>
+            <p:nvPr/>
+          </p:nvSpPr>
+          <p:spPr>
+            <a:xfrm>
+              <a:off x="4191645" y="13251810"/>
+              <a:ext cx="540000" cy="540000"/>
+            </a:xfrm>
+            <a:prstGeom prst="downArrow">
+              <a:avLst/>
+            </a:prstGeom>
+            <a:solidFill>
+              <a:schemeClr val="bg2">
+                <a:lumMod val="90000"/>
+              </a:schemeClr>
+            </a:solidFill>
+            <a:ln>
+              <a:noFill/>
+            </a:ln>
+          </p:spPr>
+          <p:style>
+            <a:lnRef idx="2">
+              <a:schemeClr val="accent1">
+                <a:shade val="50000"/>
+              </a:schemeClr>
+            </a:lnRef>
+            <a:fillRef idx="1">
+              <a:schemeClr val="accent1"/>
+            </a:fillRef>
+            <a:effectRef idx="0">
+              <a:schemeClr val="accent1"/>
+            </a:effectRef>
+            <a:fontRef idx="minor">
+              <a:schemeClr val="lt1"/>
+            </a:fontRef>
+          </p:style>
+          <p:txBody>
+            <a:bodyPr rtlCol="0" anchor="ctr"/>
+            <a:lstStyle/>
+            <a:p>
+              <a:pPr algn="ctr"/>
+              <a:endParaRPr lang="en-BE"/>
+            </a:p>
+          </p:txBody>
+        </p:sp>
+        <p:pic>
+          <p:nvPicPr>
+            <p:cNvPr id="9" name="Picture 8" descr="A picture containing pie chart&#10;&#10;Description automatically generated">
+              <a:extLst>
+                <a:ext uri="{FF2B5EF4-FFF2-40B4-BE49-F238E27FC236}">
+                  <a16:creationId xmlns:a16="http://schemas.microsoft.com/office/drawing/2014/main" id="{5DF9EAB5-8A0B-C570-7BB9-2AC714F9B5A9}"/>
+                </a:ext>
+              </a:extLst>
+            </p:cNvPr>
+            <p:cNvPicPr>
+              <a:picLocks noChangeAspect="1"/>
+            </p:cNvPicPr>
+            <p:nvPr/>
+          </p:nvPicPr>
+          <p:blipFill rotWithShape="1">
+            <a:blip r:embed="rId6"/>
+            <a:srcRect t="8072" b="7315"/>
+            <a:stretch/>
+          </p:blipFill>
+          <p:spPr>
+            <a:xfrm>
+              <a:off x="2235874" y="9647743"/>
+              <a:ext cx="4537421" cy="3263744"/>
+            </a:xfrm>
+            <a:prstGeom prst="rect">
+              <a:avLst/>
+            </a:prstGeom>
+          </p:spPr>
+        </p:pic>
+        <p:cxnSp>
+          <p:nvCxnSpPr>
+            <p:cNvPr id="10" name="Straight Connector 9">
+              <a:extLst>
+                <a:ext uri="{FF2B5EF4-FFF2-40B4-BE49-F238E27FC236}">
+                  <a16:creationId xmlns:a16="http://schemas.microsoft.com/office/drawing/2014/main" id="{227BEE03-411C-6565-6FCF-0AA0B6373FD1}"/>
+                </a:ext>
+              </a:extLst>
+            </p:cNvPr>
+            <p:cNvCxnSpPr>
+              <a:cxnSpLocks/>
+            </p:cNvCxnSpPr>
+            <p:nvPr/>
+          </p:nvCxnSpPr>
+          <p:spPr>
+            <a:xfrm>
+              <a:off x="808875" y="17558034"/>
+              <a:ext cx="648552" cy="0"/>
+            </a:xfrm>
+            <a:prstGeom prst="line">
+              <a:avLst/>
+            </a:prstGeom>
+            <a:ln w="38100">
+              <a:solidFill>
+                <a:schemeClr val="tx1"/>
+              </a:solidFill>
+            </a:ln>
+          </p:spPr>
+          <p:style>
+            <a:lnRef idx="1">
+              <a:schemeClr val="accent1"/>
+            </a:lnRef>
+            <a:fillRef idx="0">
+              <a:schemeClr val="accent1"/>
+            </a:fillRef>
+            <a:effectRef idx="0">
+              <a:schemeClr val="accent1"/>
+            </a:effectRef>
+            <a:fontRef idx="minor">
+              <a:schemeClr val="tx1"/>
+            </a:fontRef>
+          </p:style>
+        </p:cxnSp>
+        <p:sp>
+          <p:nvSpPr>
+            <p:cNvPr id="12" name="TextBox 11">
+              <a:extLst>
+                <a:ext uri="{FF2B5EF4-FFF2-40B4-BE49-F238E27FC236}">
+                  <a16:creationId xmlns:a16="http://schemas.microsoft.com/office/drawing/2014/main" id="{948A51DB-C42F-F1C8-6B33-CFE7ED372E45}"/>
+                </a:ext>
+              </a:extLst>
+            </p:cNvPr>
+            <p:cNvSpPr txBox="1"/>
+            <p:nvPr/>
+          </p:nvSpPr>
+          <p:spPr>
+            <a:xfrm rot="5400000">
+              <a:off x="-397364" y="15383442"/>
+              <a:ext cx="3077783" cy="769441"/>
+            </a:xfrm>
+            <a:prstGeom prst="rect">
+              <a:avLst/>
+            </a:prstGeom>
+            <a:noFill/>
+          </p:spPr>
+          <p:txBody>
+            <a:bodyPr wrap="square" rtlCol="0">
+              <a:spAutoFit/>
+            </a:bodyPr>
+            <a:lstStyle/>
+            <a:p>
+              <a:pPr algn="ctr"/>
+              <a:r>
+                <a:rPr lang="en-BE" sz="4400" dirty="0"/>
+                <a:t>1000 ms</a:t>
+              </a:r>
+            </a:p>
+          </p:txBody>
+        </p:sp>
+        <p:cxnSp>
+          <p:nvCxnSpPr>
+            <p:cNvPr id="13" name="Straight Connector 12">
+              <a:extLst>
+                <a:ext uri="{FF2B5EF4-FFF2-40B4-BE49-F238E27FC236}">
+                  <a16:creationId xmlns:a16="http://schemas.microsoft.com/office/drawing/2014/main" id="{AE656261-9434-36A7-A015-4BD5F5DE79E9}"/>
+                </a:ext>
+              </a:extLst>
+            </p:cNvPr>
+            <p:cNvCxnSpPr/>
+            <p:nvPr/>
+          </p:nvCxnSpPr>
+          <p:spPr>
+            <a:xfrm>
+              <a:off x="817251" y="13945872"/>
+              <a:ext cx="648552" cy="0"/>
+            </a:xfrm>
+            <a:prstGeom prst="line">
+              <a:avLst/>
+            </a:prstGeom>
+            <a:ln w="38100">
+              <a:solidFill>
+                <a:schemeClr val="tx1"/>
+              </a:solidFill>
+            </a:ln>
+          </p:spPr>
+          <p:style>
+            <a:lnRef idx="1">
+              <a:schemeClr val="accent1"/>
+            </a:lnRef>
+            <a:fillRef idx="0">
+              <a:schemeClr val="accent1"/>
+            </a:fillRef>
+            <a:effectRef idx="0">
+              <a:schemeClr val="accent1"/>
+            </a:effectRef>
+            <a:fontRef idx="minor">
+              <a:schemeClr val="tx1"/>
+            </a:fontRef>
+          </p:style>
+        </p:cxnSp>
+        <p:sp>
+          <p:nvSpPr>
+            <p:cNvPr id="14" name="Rectangle 13">
+              <a:extLst>
+                <a:ext uri="{FF2B5EF4-FFF2-40B4-BE49-F238E27FC236}">
+                  <a16:creationId xmlns:a16="http://schemas.microsoft.com/office/drawing/2014/main" id="{7F905CC2-3424-F954-01F2-E714EB2F3BA9}"/>
+                </a:ext>
+              </a:extLst>
+            </p:cNvPr>
+            <p:cNvSpPr/>
+            <p:nvPr/>
+          </p:nvSpPr>
+          <p:spPr>
+            <a:xfrm>
+              <a:off x="8674111" y="9443154"/>
+              <a:ext cx="5050972" cy="3669475"/>
+            </a:xfrm>
+            <a:prstGeom prst="rect">
+              <a:avLst/>
+            </a:prstGeom>
+            <a:noFill/>
+            <a:ln w="38100">
+              <a:solidFill>
+                <a:schemeClr val="tx1"/>
+              </a:solidFill>
+            </a:ln>
+            <a:effectLst/>
+          </p:spPr>
+          <p:style>
+            <a:lnRef idx="2">
+              <a:schemeClr val="accent1">
+                <a:shade val="50000"/>
+              </a:schemeClr>
+            </a:lnRef>
+            <a:fillRef idx="1">
+              <a:schemeClr val="accent1"/>
+            </a:fillRef>
+            <a:effectRef idx="0">
+              <a:schemeClr val="accent1"/>
+            </a:effectRef>
+            <a:fontRef idx="minor">
+              <a:schemeClr val="lt1"/>
+            </a:fontRef>
+          </p:style>
+          <p:txBody>
+            <a:bodyPr rtlCol="0" anchor="ctr"/>
+            <a:lstStyle/>
+            <a:p>
+              <a:pPr algn="ctr"/>
+              <a:endParaRPr lang="en-BE"/>
+            </a:p>
+          </p:txBody>
+        </p:sp>
+        <p:pic>
+          <p:nvPicPr>
+            <p:cNvPr id="22" name="Picture 21" descr="A picture containing accessory, umbrella, vector graphics&#10;&#10;Description automatically generated">
+              <a:extLst>
+                <a:ext uri="{FF2B5EF4-FFF2-40B4-BE49-F238E27FC236}">
+                  <a16:creationId xmlns:a16="http://schemas.microsoft.com/office/drawing/2014/main" id="{C732AB00-CAF8-309E-5F31-F800B44E405F}"/>
+                </a:ext>
+              </a:extLst>
+            </p:cNvPr>
+            <p:cNvPicPr>
+              <a:picLocks noChangeAspect="1"/>
+            </p:cNvPicPr>
+            <p:nvPr/>
+          </p:nvPicPr>
+          <p:blipFill>
+            <a:blip r:embed="rId7"/>
+            <a:stretch>
+              <a:fillRect/>
+            </a:stretch>
+          </p:blipFill>
+          <p:spPr>
+            <a:xfrm>
+              <a:off x="9696883" y="9591918"/>
+              <a:ext cx="3119416" cy="3402999"/>
+            </a:xfrm>
+            <a:prstGeom prst="rect">
+              <a:avLst/>
+            </a:prstGeom>
+          </p:spPr>
+        </p:pic>
+        <p:cxnSp>
+          <p:nvCxnSpPr>
+            <p:cNvPr id="25" name="Straight Connector 24">
+              <a:extLst>
+                <a:ext uri="{FF2B5EF4-FFF2-40B4-BE49-F238E27FC236}">
+                  <a16:creationId xmlns:a16="http://schemas.microsoft.com/office/drawing/2014/main" id="{A841CAFE-1AF2-35BE-B323-BF53BA98907D}"/>
+                </a:ext>
+              </a:extLst>
+            </p:cNvPr>
+            <p:cNvCxnSpPr/>
+            <p:nvPr/>
+          </p:nvCxnSpPr>
+          <p:spPr>
+            <a:xfrm>
+              <a:off x="756807" y="22149053"/>
+              <a:ext cx="648552" cy="0"/>
+            </a:xfrm>
+            <a:prstGeom prst="line">
+              <a:avLst/>
+            </a:prstGeom>
+            <a:ln w="38100">
+              <a:solidFill>
+                <a:schemeClr val="tx1"/>
+              </a:solidFill>
+            </a:ln>
+          </p:spPr>
+          <p:style>
+            <a:lnRef idx="1">
+              <a:schemeClr val="accent1"/>
+            </a:lnRef>
+            <a:fillRef idx="0">
+              <a:schemeClr val="accent1"/>
+            </a:fillRef>
+            <a:effectRef idx="0">
+              <a:schemeClr val="accent1"/>
+            </a:effectRef>
+            <a:fontRef idx="minor">
+              <a:schemeClr val="tx1"/>
+            </a:fontRef>
+          </p:style>
+        </p:cxnSp>
+        <p:cxnSp>
+          <p:nvCxnSpPr>
+            <p:cNvPr id="34" name="Straight Connector 33">
+              <a:extLst>
+                <a:ext uri="{FF2B5EF4-FFF2-40B4-BE49-F238E27FC236}">
+                  <a16:creationId xmlns:a16="http://schemas.microsoft.com/office/drawing/2014/main" id="{63BDBE84-10DC-F97D-EF1C-CEE46670D0D3}"/>
+                </a:ext>
+              </a:extLst>
+            </p:cNvPr>
+            <p:cNvCxnSpPr>
+              <a:cxnSpLocks/>
+            </p:cNvCxnSpPr>
+            <p:nvPr/>
+          </p:nvCxnSpPr>
+          <p:spPr>
+            <a:xfrm>
+              <a:off x="784843" y="18489841"/>
+              <a:ext cx="648552" cy="0"/>
+            </a:xfrm>
+            <a:prstGeom prst="line">
+              <a:avLst/>
+            </a:prstGeom>
+            <a:ln w="38100">
+              <a:solidFill>
+                <a:schemeClr val="tx1"/>
+              </a:solidFill>
+            </a:ln>
+          </p:spPr>
+          <p:style>
+            <a:lnRef idx="1">
+              <a:schemeClr val="accent1"/>
+            </a:lnRef>
+            <a:fillRef idx="0">
+              <a:schemeClr val="accent1"/>
+            </a:fillRef>
+            <a:effectRef idx="0">
+              <a:schemeClr val="accent1"/>
+            </a:effectRef>
+            <a:fontRef idx="minor">
+              <a:schemeClr val="tx1"/>
+            </a:fontRef>
+          </p:style>
+        </p:cxnSp>
+        <p:sp>
+          <p:nvSpPr>
+            <p:cNvPr id="35" name="TextBox 34">
+              <a:extLst>
+                <a:ext uri="{FF2B5EF4-FFF2-40B4-BE49-F238E27FC236}">
+                  <a16:creationId xmlns:a16="http://schemas.microsoft.com/office/drawing/2014/main" id="{0337A01B-9D51-6096-2253-55194C45AB99}"/>
+                </a:ext>
+              </a:extLst>
+            </p:cNvPr>
+            <p:cNvSpPr txBox="1"/>
+            <p:nvPr/>
+          </p:nvSpPr>
+          <p:spPr>
+            <a:xfrm rot="5400000">
+              <a:off x="-713141" y="20032191"/>
+              <a:ext cx="3669476" cy="584775"/>
+            </a:xfrm>
+            <a:prstGeom prst="rect">
+              <a:avLst/>
+            </a:prstGeom>
+            <a:noFill/>
+          </p:spPr>
+          <p:txBody>
+            <a:bodyPr wrap="square" rtlCol="0">
+              <a:spAutoFit/>
+            </a:bodyPr>
+            <a:lstStyle/>
+            <a:p>
+              <a:pPr algn="ctr"/>
+              <a:r>
+                <a:rPr lang="en-BE" sz="3200" dirty="0"/>
+                <a:t>0 (300) or 3000 ms</a:t>
+              </a:r>
+            </a:p>
+          </p:txBody>
+        </p:sp>
+        <p:sp>
+          <p:nvSpPr>
+            <p:cNvPr id="37" name="Down Arrow 36">
+              <a:extLst>
+                <a:ext uri="{FF2B5EF4-FFF2-40B4-BE49-F238E27FC236}">
+                  <a16:creationId xmlns:a16="http://schemas.microsoft.com/office/drawing/2014/main" id="{F5FA931D-C293-AFB8-8D6B-8FC4B4A0EC84}"/>
+                </a:ext>
+              </a:extLst>
+            </p:cNvPr>
+            <p:cNvSpPr/>
+            <p:nvPr/>
+          </p:nvSpPr>
+          <p:spPr>
+            <a:xfrm>
+              <a:off x="4191645" y="17772589"/>
+              <a:ext cx="540000" cy="540000"/>
+            </a:xfrm>
+            <a:prstGeom prst="downArrow">
+              <a:avLst/>
+            </a:prstGeom>
+            <a:solidFill>
+              <a:schemeClr val="bg2">
+                <a:lumMod val="90000"/>
+              </a:schemeClr>
+            </a:solidFill>
+            <a:ln>
+              <a:noFill/>
+            </a:ln>
+          </p:spPr>
+          <p:style>
+            <a:lnRef idx="2">
+              <a:schemeClr val="accent1">
+                <a:shade val="50000"/>
+              </a:schemeClr>
+            </a:lnRef>
+            <a:fillRef idx="1">
+              <a:schemeClr val="accent1"/>
+            </a:fillRef>
+            <a:effectRef idx="0">
+              <a:schemeClr val="accent1"/>
+            </a:effectRef>
+            <a:fontRef idx="minor">
+              <a:schemeClr val="lt1"/>
+            </a:fontRef>
+          </p:style>
+          <p:txBody>
+            <a:bodyPr rtlCol="0" anchor="ctr"/>
+            <a:lstStyle/>
+            <a:p>
+              <a:pPr algn="ctr"/>
+              <a:endParaRPr lang="en-BE"/>
+            </a:p>
+          </p:txBody>
+        </p:sp>
+        <p:sp>
+          <p:nvSpPr>
+            <p:cNvPr id="39" name="Rectangle 38">
+              <a:extLst>
+                <a:ext uri="{FF2B5EF4-FFF2-40B4-BE49-F238E27FC236}">
+                  <a16:creationId xmlns:a16="http://schemas.microsoft.com/office/drawing/2014/main" id="{AAD8B9A3-8686-EDE9-87D2-C590C9017751}"/>
+                </a:ext>
+              </a:extLst>
+            </p:cNvPr>
+            <p:cNvSpPr/>
+            <p:nvPr/>
+          </p:nvSpPr>
+          <p:spPr>
+            <a:xfrm>
+              <a:off x="8674111" y="13933424"/>
+              <a:ext cx="5050972" cy="3669475"/>
+            </a:xfrm>
+            <a:prstGeom prst="rect">
+              <a:avLst/>
+            </a:prstGeom>
+            <a:noFill/>
+            <a:ln w="38100">
+              <a:solidFill>
+                <a:schemeClr val="tx1"/>
+              </a:solidFill>
+            </a:ln>
+            <a:effectLst/>
+          </p:spPr>
+          <p:style>
+            <a:lnRef idx="2">
+              <a:schemeClr val="accent1">
+                <a:shade val="50000"/>
+              </a:schemeClr>
+            </a:lnRef>
+            <a:fillRef idx="1">
+              <a:schemeClr val="accent1"/>
+            </a:fillRef>
+            <a:effectRef idx="0">
+              <a:schemeClr val="accent1"/>
+            </a:effectRef>
+            <a:fontRef idx="minor">
+              <a:schemeClr val="lt1"/>
+            </a:fontRef>
+          </p:style>
+          <p:txBody>
+            <a:bodyPr rtlCol="0" anchor="ctr"/>
+            <a:lstStyle/>
+            <a:p>
+              <a:pPr algn="ctr"/>
+              <a:endParaRPr lang="en-BE"/>
+            </a:p>
+          </p:txBody>
+        </p:sp>
+        <p:cxnSp>
+          <p:nvCxnSpPr>
+            <p:cNvPr id="41" name="Straight Connector 40">
+              <a:extLst>
+                <a:ext uri="{FF2B5EF4-FFF2-40B4-BE49-F238E27FC236}">
+                  <a16:creationId xmlns:a16="http://schemas.microsoft.com/office/drawing/2014/main" id="{0DEC9D56-1C8B-DA84-3C85-640FC485B41D}"/>
+                </a:ext>
+              </a:extLst>
+            </p:cNvPr>
+            <p:cNvCxnSpPr/>
+            <p:nvPr/>
+          </p:nvCxnSpPr>
+          <p:spPr>
+            <a:xfrm>
+              <a:off x="7618468" y="13945872"/>
+              <a:ext cx="648552" cy="0"/>
+            </a:xfrm>
+            <a:prstGeom prst="line">
+              <a:avLst/>
+            </a:prstGeom>
+            <a:ln w="38100">
+              <a:solidFill>
+                <a:schemeClr val="tx1"/>
+              </a:solidFill>
+            </a:ln>
+          </p:spPr>
+          <p:style>
+            <a:lnRef idx="1">
+              <a:schemeClr val="accent1"/>
+            </a:lnRef>
+            <a:fillRef idx="0">
+              <a:schemeClr val="accent1"/>
+            </a:fillRef>
+            <a:effectRef idx="0">
+              <a:schemeClr val="accent1"/>
+            </a:effectRef>
+            <a:fontRef idx="minor">
+              <a:schemeClr val="tx1"/>
+            </a:fontRef>
+          </p:style>
+        </p:cxnSp>
+        <p:cxnSp>
+          <p:nvCxnSpPr>
+            <p:cNvPr id="61" name="Straight Connector 60">
+              <a:extLst>
+                <a:ext uri="{FF2B5EF4-FFF2-40B4-BE49-F238E27FC236}">
+                  <a16:creationId xmlns:a16="http://schemas.microsoft.com/office/drawing/2014/main" id="{D30B9F1B-A9C7-7DEC-4310-ABA13AC89955}"/>
+                </a:ext>
+              </a:extLst>
+            </p:cNvPr>
+            <p:cNvCxnSpPr/>
+            <p:nvPr/>
+          </p:nvCxnSpPr>
+          <p:spPr>
+            <a:xfrm>
+              <a:off x="7616591" y="17602899"/>
+              <a:ext cx="648552" cy="0"/>
+            </a:xfrm>
+            <a:prstGeom prst="line">
+              <a:avLst/>
+            </a:prstGeom>
+            <a:ln w="38100">
+              <a:solidFill>
+                <a:schemeClr val="tx1"/>
+              </a:solidFill>
+            </a:ln>
+          </p:spPr>
+          <p:style>
+            <a:lnRef idx="1">
+              <a:schemeClr val="accent1"/>
+            </a:lnRef>
+            <a:fillRef idx="0">
+              <a:schemeClr val="accent1"/>
+            </a:fillRef>
+            <a:effectRef idx="0">
+              <a:schemeClr val="accent1"/>
+            </a:effectRef>
+            <a:fontRef idx="minor">
+              <a:schemeClr val="tx1"/>
+            </a:fontRef>
+          </p:style>
+        </p:cxnSp>
+        <p:cxnSp>
+          <p:nvCxnSpPr>
+            <p:cNvPr id="62" name="Straight Connector 61">
+              <a:extLst>
+                <a:ext uri="{FF2B5EF4-FFF2-40B4-BE49-F238E27FC236}">
+                  <a16:creationId xmlns:a16="http://schemas.microsoft.com/office/drawing/2014/main" id="{AA851A73-2773-7B6C-6080-98BB134BD428}"/>
+                </a:ext>
+              </a:extLst>
+            </p:cNvPr>
+            <p:cNvCxnSpPr/>
+            <p:nvPr/>
+          </p:nvCxnSpPr>
+          <p:spPr>
+            <a:xfrm>
+              <a:off x="7640037" y="18489840"/>
+              <a:ext cx="648552" cy="0"/>
+            </a:xfrm>
+            <a:prstGeom prst="line">
+              <a:avLst/>
+            </a:prstGeom>
+            <a:ln w="38100">
+              <a:solidFill>
+                <a:schemeClr val="tx1"/>
+              </a:solidFill>
+            </a:ln>
+          </p:spPr>
+          <p:style>
+            <a:lnRef idx="1">
+              <a:schemeClr val="accent1"/>
+            </a:lnRef>
+            <a:fillRef idx="0">
+              <a:schemeClr val="accent1"/>
+            </a:fillRef>
+            <a:effectRef idx="0">
+              <a:schemeClr val="accent1"/>
+            </a:effectRef>
+            <a:fontRef idx="minor">
+              <a:schemeClr val="tx1"/>
+            </a:fontRef>
+          </p:style>
+        </p:cxnSp>
+        <p:cxnSp>
+          <p:nvCxnSpPr>
+            <p:cNvPr id="63" name="Straight Connector 62">
+              <a:extLst>
+                <a:ext uri="{FF2B5EF4-FFF2-40B4-BE49-F238E27FC236}">
+                  <a16:creationId xmlns:a16="http://schemas.microsoft.com/office/drawing/2014/main" id="{81F73BE9-E52F-BE3E-5AF5-A2060CAD0AE9}"/>
+                </a:ext>
+              </a:extLst>
+            </p:cNvPr>
+            <p:cNvCxnSpPr/>
+            <p:nvPr/>
+          </p:nvCxnSpPr>
+          <p:spPr>
+            <a:xfrm>
+              <a:off x="7595415" y="22166451"/>
+              <a:ext cx="648552" cy="0"/>
+            </a:xfrm>
+            <a:prstGeom prst="line">
+              <a:avLst/>
+            </a:prstGeom>
+            <a:ln w="38100">
+              <a:solidFill>
+                <a:schemeClr val="tx1"/>
+              </a:solidFill>
+            </a:ln>
+          </p:spPr>
+          <p:style>
+            <a:lnRef idx="1">
+              <a:schemeClr val="accent1"/>
+            </a:lnRef>
+            <a:fillRef idx="0">
+              <a:schemeClr val="accent1"/>
+            </a:fillRef>
+            <a:effectRef idx="0">
+              <a:schemeClr val="accent1"/>
+            </a:effectRef>
+            <a:fontRef idx="minor">
+              <a:schemeClr val="tx1"/>
+            </a:fontRef>
+          </p:style>
+        </p:cxnSp>
+        <p:pic>
+          <p:nvPicPr>
+            <p:cNvPr id="68" name="Picture 67" descr="A picture containing accessory, umbrella, vector graphics&#10;&#10;Description automatically generated">
+              <a:extLst>
+                <a:ext uri="{FF2B5EF4-FFF2-40B4-BE49-F238E27FC236}">
+                  <a16:creationId xmlns:a16="http://schemas.microsoft.com/office/drawing/2014/main" id="{4BE66A88-3770-6A85-D370-9B5846638FF9}"/>
+                </a:ext>
+              </a:extLst>
+            </p:cNvPr>
+            <p:cNvPicPr>
+              <a:picLocks noChangeAspect="1"/>
+            </p:cNvPicPr>
+            <p:nvPr/>
+          </p:nvPicPr>
+          <p:blipFill rotWithShape="1">
+            <a:blip r:embed="rId8"/>
+            <a:srcRect t="6407" b="13078"/>
+            <a:stretch/>
+          </p:blipFill>
+          <p:spPr>
+            <a:xfrm>
+              <a:off x="9458619" y="14324950"/>
+              <a:ext cx="3693502" cy="2916000"/>
+            </a:xfrm>
+            <a:prstGeom prst="rect">
+              <a:avLst/>
+            </a:prstGeom>
+          </p:spPr>
+        </p:pic>
+        <p:sp>
+          <p:nvSpPr>
+            <p:cNvPr id="77" name="TextBox 76">
+              <a:extLst>
+                <a:ext uri="{FF2B5EF4-FFF2-40B4-BE49-F238E27FC236}">
+                  <a16:creationId xmlns:a16="http://schemas.microsoft.com/office/drawing/2014/main" id="{0A70C163-FDD5-F8E4-1B9B-C959A6BCC733}"/>
+                </a:ext>
+              </a:extLst>
+            </p:cNvPr>
+            <p:cNvSpPr txBox="1"/>
+            <p:nvPr/>
+          </p:nvSpPr>
+          <p:spPr>
+            <a:xfrm rot="5400000">
+              <a:off x="6462421" y="15416515"/>
+              <a:ext cx="3077780" cy="769441"/>
+            </a:xfrm>
+            <a:prstGeom prst="rect">
+              <a:avLst/>
+            </a:prstGeom>
+            <a:noFill/>
+          </p:spPr>
+          <p:txBody>
+            <a:bodyPr wrap="square" rtlCol="0">
+              <a:spAutoFit/>
+            </a:bodyPr>
+            <a:lstStyle/>
+            <a:p>
+              <a:pPr algn="ctr"/>
+              <a:r>
+                <a:rPr lang="en-BE" sz="4400" dirty="0"/>
+                <a:t>1500 ms</a:t>
+              </a:r>
+            </a:p>
+          </p:txBody>
+        </p:sp>
+        <p:sp>
+          <p:nvSpPr>
+            <p:cNvPr id="78" name="TextBox 77">
+              <a:extLst>
+                <a:ext uri="{FF2B5EF4-FFF2-40B4-BE49-F238E27FC236}">
+                  <a16:creationId xmlns:a16="http://schemas.microsoft.com/office/drawing/2014/main" id="{61310419-E006-EDF9-237A-78E1E847EB0F}"/>
+                </a:ext>
+              </a:extLst>
+            </p:cNvPr>
+            <p:cNvSpPr txBox="1"/>
+            <p:nvPr/>
+          </p:nvSpPr>
+          <p:spPr>
+            <a:xfrm rot="5400000">
+              <a:off x="6478242" y="19866653"/>
+              <a:ext cx="3077780" cy="769441"/>
+            </a:xfrm>
+            <a:prstGeom prst="rect">
+              <a:avLst/>
+            </a:prstGeom>
+            <a:noFill/>
+          </p:spPr>
+          <p:txBody>
+            <a:bodyPr wrap="square" rtlCol="0">
+              <a:spAutoFit/>
+            </a:bodyPr>
+            <a:lstStyle/>
+            <a:p>
+              <a:pPr algn="ctr"/>
+              <a:r>
+                <a:rPr lang="en-BE" sz="4400" dirty="0"/>
+                <a:t>1000 ms</a:t>
+              </a:r>
+            </a:p>
+          </p:txBody>
+        </p:sp>
       </p:grpSp>
-      <p:sp>
-        <p:nvSpPr>
-          <p:cNvPr id="65" name="TextBox 64">
+      <p:pic>
+        <p:nvPicPr>
+          <p:cNvPr id="84" name="Graphic 83">
             <a:extLst>
               <a:ext uri="{FF2B5EF4-FFF2-40B4-BE49-F238E27FC236}">
-                <a16:creationId xmlns:a16="http://schemas.microsoft.com/office/drawing/2014/main" id="{C5072EF2-8371-FB4C-1255-8D42F1D0107C}"/>
+                <a16:creationId xmlns:a16="http://schemas.microsoft.com/office/drawing/2014/main" id="{FBCE69B3-C76B-FE90-202D-A38E87DFDC4E}"/>
               </a:ext>
             </a:extLst>
           </p:cNvPr>
-          <p:cNvSpPr txBox="1"/>
+          <p:cNvPicPr>
+            <a:picLocks noChangeAspect="1"/>
+          </p:cNvPicPr>
           <p:nvPr/>
-        </p:nvSpPr>
+        </p:nvPicPr>
+        <p:blipFill rotWithShape="1">
+          <a:blip r:embed="rId9">
+            <a:extLst>
+              <a:ext uri="{96DAC541-7B7A-43D3-8B79-37D633B846F1}">
+                <asvg:svgBlip xmlns:asvg="http://schemas.microsoft.com/office/drawing/2016/SVG/main" r:embed="rId10"/>
+              </a:ext>
+            </a:extLst>
+          </a:blip>
+          <a:srcRect r="32385" b="20824"/>
+          <a:stretch/>
+        </p:blipFill>
         <p:spPr>
-          <a:xfrm rot="5400000">
-            <a:off x="-426322" y="1931992"/>
-            <a:ext cx="3077783" cy="769441"/>
+          <a:xfrm rot="8710277">
+            <a:off x="5214764" y="10662984"/>
+            <a:ext cx="1098291" cy="1286080"/>
           </a:xfrm>
           <a:prstGeom prst="rect">
             <a:avLst/>
           </a:prstGeom>
-          <a:noFill/>
         </p:spPr>
-        <p:txBody>
-          <a:bodyPr wrap="square" rtlCol="0">
-            <a:spAutoFit/>
-          </a:bodyPr>
-          <a:lstStyle/>
-          <a:p>
-            <a:pPr algn="ctr"/>
-            <a:r>
-              <a:rPr lang="en-BE" sz="4400" dirty="0"/>
-              <a:t>Self-Paced</a:t>
-            </a:r>
-          </a:p>
-        </p:txBody>
-      </p:sp>
-      <p:sp>
-        <p:nvSpPr>
-          <p:cNvPr id="66" name="TextBox 65">
+      </p:pic>
+      <p:pic>
+        <p:nvPicPr>
+          <p:cNvPr id="85" name="Graphic 84">
             <a:extLst>
               <a:ext uri="{FF2B5EF4-FFF2-40B4-BE49-F238E27FC236}">
-                <a16:creationId xmlns:a16="http://schemas.microsoft.com/office/drawing/2014/main" id="{3BE0496A-49B1-3B6B-518C-DB03975D28AD}"/>
+                <a16:creationId xmlns:a16="http://schemas.microsoft.com/office/drawing/2014/main" id="{4ED95CC5-C74F-D89D-920F-C49456B010D1}"/>
               </a:ext>
             </a:extLst>
           </p:cNvPr>
-          <p:cNvSpPr txBox="1"/>
+          <p:cNvPicPr>
+            <a:picLocks noChangeAspect="1"/>
+          </p:cNvPicPr>
           <p:nvPr/>
-        </p:nvSpPr>
+        </p:nvPicPr>
+        <p:blipFill rotWithShape="1">
+          <a:blip r:embed="rId9">
+            <a:extLst>
+              <a:ext uri="{96DAC541-7B7A-43D3-8B79-37D633B846F1}">
+                <asvg:svgBlip xmlns:asvg="http://schemas.microsoft.com/office/drawing/2016/SVG/main" r:embed="rId10"/>
+              </a:ext>
+            </a:extLst>
+          </a:blip>
+          <a:srcRect r="32385" b="20824"/>
+          <a:stretch/>
+        </p:blipFill>
         <p:spPr>
-          <a:xfrm rot="5400000">
-            <a:off x="-454357" y="6430240"/>
-            <a:ext cx="3077783" cy="769441"/>
+          <a:xfrm rot="8710277">
+            <a:off x="12133724" y="15692184"/>
+            <a:ext cx="1098291" cy="1286080"/>
           </a:xfrm>
           <a:prstGeom prst="rect">
             <a:avLst/>
           </a:prstGeom>
-          <a:noFill/>
         </p:spPr>
-        <p:txBody>
-          <a:bodyPr wrap="square" rtlCol="0">
-            <a:spAutoFit/>
-          </a:bodyPr>
-          <a:lstStyle/>
-          <a:p>
-            <a:pPr algn="ctr"/>
-            <a:r>
-              <a:rPr lang="en-BE" sz="4400" dirty="0"/>
-              <a:t>Self-Paced</a:t>
-            </a:r>
-          </a:p>
-        </p:txBody>
-      </p:sp>
-      <p:sp>
-        <p:nvSpPr>
-          <p:cNvPr id="67" name="TextBox 66">
-            <a:extLst>
-              <a:ext uri="{FF2B5EF4-FFF2-40B4-BE49-F238E27FC236}">
-                <a16:creationId xmlns:a16="http://schemas.microsoft.com/office/drawing/2014/main" id="{15C5F534-A368-CB9B-A8A2-2E29D323087C}"/>
-              </a:ext>
-            </a:extLst>
-          </p:cNvPr>
-          <p:cNvSpPr txBox="1"/>
-          <p:nvPr/>
-        </p:nvSpPr>
-        <p:spPr>
-          <a:xfrm rot="5400000">
-            <a:off x="-479861" y="10883637"/>
-            <a:ext cx="3077783" cy="769441"/>
-          </a:xfrm>
-          <a:prstGeom prst="rect">
-            <a:avLst/>
-          </a:prstGeom>
-          <a:noFill/>
-        </p:spPr>
-        <p:txBody>
-          <a:bodyPr wrap="square" rtlCol="0">
-            <a:spAutoFit/>
-          </a:bodyPr>
-          <a:lstStyle/>
-          <a:p>
-            <a:pPr algn="ctr"/>
-            <a:r>
-              <a:rPr lang="en-BE" sz="4400" dirty="0"/>
-              <a:t>2500 ms</a:t>
-            </a:r>
-          </a:p>
-        </p:txBody>
-      </p:sp>
-      <p:sp>
-        <p:nvSpPr>
-          <p:cNvPr id="69" name="TextBox 68">
-            <a:extLst>
-              <a:ext uri="{FF2B5EF4-FFF2-40B4-BE49-F238E27FC236}">
-                <a16:creationId xmlns:a16="http://schemas.microsoft.com/office/drawing/2014/main" id="{8D41A193-CFF5-32BE-C6F7-2F86AD40AD71}"/>
-              </a:ext>
-            </a:extLst>
-          </p:cNvPr>
-          <p:cNvSpPr txBox="1"/>
-          <p:nvPr/>
-        </p:nvSpPr>
-        <p:spPr>
-          <a:xfrm rot="5400000">
-            <a:off x="6400086" y="1931994"/>
-            <a:ext cx="3669476" cy="769441"/>
-          </a:xfrm>
-          <a:prstGeom prst="rect">
-            <a:avLst/>
-          </a:prstGeom>
-          <a:noFill/>
-        </p:spPr>
-        <p:txBody>
-          <a:bodyPr wrap="square" rtlCol="0">
-            <a:spAutoFit/>
-          </a:bodyPr>
-          <a:lstStyle/>
-          <a:p>
-            <a:pPr algn="ctr"/>
-            <a:r>
-              <a:rPr lang="en-BE" sz="4400" dirty="0"/>
-              <a:t>0 or 3000 ms</a:t>
-            </a:r>
-          </a:p>
-        </p:txBody>
-      </p:sp>
-      <p:sp>
-        <p:nvSpPr>
-          <p:cNvPr id="70" name="TextBox 69">
-            <a:extLst>
-              <a:ext uri="{FF2B5EF4-FFF2-40B4-BE49-F238E27FC236}">
-                <a16:creationId xmlns:a16="http://schemas.microsoft.com/office/drawing/2014/main" id="{5FD4604A-A1EC-C5AB-258E-E2D09AB67B75}"/>
-              </a:ext>
-            </a:extLst>
-          </p:cNvPr>
-          <p:cNvSpPr txBox="1"/>
-          <p:nvPr/>
-        </p:nvSpPr>
-        <p:spPr>
-          <a:xfrm rot="5400000">
-            <a:off x="6421307" y="6395133"/>
-            <a:ext cx="3669470" cy="769441"/>
-          </a:xfrm>
-          <a:prstGeom prst="rect">
-            <a:avLst/>
-          </a:prstGeom>
-          <a:noFill/>
-        </p:spPr>
-        <p:txBody>
-          <a:bodyPr wrap="square" rtlCol="0">
-            <a:spAutoFit/>
-          </a:bodyPr>
-          <a:lstStyle/>
-          <a:p>
-            <a:pPr algn="ctr"/>
-            <a:r>
-              <a:rPr lang="en-BE" sz="4400" dirty="0"/>
-              <a:t>Self-Paced</a:t>
-            </a:r>
-          </a:p>
-        </p:txBody>
-      </p:sp>
-      <p:sp>
-        <p:nvSpPr>
-          <p:cNvPr id="71" name="TextBox 70">
-            <a:extLst>
-              <a:ext uri="{FF2B5EF4-FFF2-40B4-BE49-F238E27FC236}">
-                <a16:creationId xmlns:a16="http://schemas.microsoft.com/office/drawing/2014/main" id="{9C3236FC-09C9-702E-8CE8-F60BA47B7C4B}"/>
-              </a:ext>
-            </a:extLst>
-          </p:cNvPr>
-          <p:cNvSpPr txBox="1"/>
-          <p:nvPr/>
-        </p:nvSpPr>
-        <p:spPr>
-          <a:xfrm rot="5400000">
-            <a:off x="6390688" y="10880713"/>
-            <a:ext cx="3669470" cy="769441"/>
-          </a:xfrm>
-          <a:prstGeom prst="rect">
-            <a:avLst/>
-          </a:prstGeom>
-          <a:noFill/>
-        </p:spPr>
-        <p:txBody>
-          <a:bodyPr wrap="square" rtlCol="0">
-            <a:spAutoFit/>
-          </a:bodyPr>
-          <a:lstStyle/>
-          <a:p>
-            <a:pPr algn="ctr"/>
-            <a:r>
-              <a:rPr lang="en-BE" sz="4400" dirty="0"/>
-              <a:t>Self-Paced</a:t>
-            </a:r>
-          </a:p>
-        </p:txBody>
-      </p:sp>
-      <p:sp>
-        <p:nvSpPr>
-          <p:cNvPr id="72" name="TextBox 71">
-            <a:extLst>
-              <a:ext uri="{FF2B5EF4-FFF2-40B4-BE49-F238E27FC236}">
-                <a16:creationId xmlns:a16="http://schemas.microsoft.com/office/drawing/2014/main" id="{0430DE07-A4CC-6FD8-D784-A23D2A6639B7}"/>
-              </a:ext>
-            </a:extLst>
-          </p:cNvPr>
-          <p:cNvSpPr txBox="1"/>
-          <p:nvPr/>
-        </p:nvSpPr>
-        <p:spPr>
-          <a:xfrm rot="5400000">
-            <a:off x="6452131" y="15343856"/>
-            <a:ext cx="3624608" cy="769441"/>
-          </a:xfrm>
-          <a:prstGeom prst="rect">
-            <a:avLst/>
-          </a:prstGeom>
-          <a:noFill/>
-        </p:spPr>
-        <p:txBody>
-          <a:bodyPr wrap="square" rtlCol="0">
-            <a:spAutoFit/>
-          </a:bodyPr>
-          <a:lstStyle/>
-          <a:p>
-            <a:pPr algn="ctr"/>
-            <a:r>
-              <a:rPr lang="en-BE" sz="4400" dirty="0"/>
-              <a:t>3000 ms</a:t>
-            </a:r>
-          </a:p>
-        </p:txBody>
-      </p:sp>
-      <p:sp>
-        <p:nvSpPr>
-          <p:cNvPr id="73" name="Down Arrow 72">
-            <a:extLst>
-              <a:ext uri="{FF2B5EF4-FFF2-40B4-BE49-F238E27FC236}">
-                <a16:creationId xmlns:a16="http://schemas.microsoft.com/office/drawing/2014/main" id="{3D4E30E7-25EC-ACEC-4B41-197CAAA4591F}"/>
-              </a:ext>
-            </a:extLst>
-          </p:cNvPr>
-          <p:cNvSpPr/>
-          <p:nvPr/>
-        </p:nvSpPr>
-        <p:spPr>
-          <a:xfrm>
-            <a:off x="4134651" y="8727839"/>
-            <a:ext cx="540000" cy="540000"/>
-          </a:xfrm>
-          <a:prstGeom prst="downArrow">
-            <a:avLst/>
-          </a:prstGeom>
-          <a:solidFill>
-            <a:schemeClr val="bg2">
-              <a:lumMod val="90000"/>
-            </a:schemeClr>
-          </a:solidFill>
-          <a:ln>
-            <a:noFill/>
-          </a:ln>
-        </p:spPr>
-        <p:style>
-          <a:lnRef idx="2">
-            <a:schemeClr val="accent1">
-              <a:shade val="50000"/>
-            </a:schemeClr>
-          </a:lnRef>
-          <a:fillRef idx="1">
-            <a:schemeClr val="accent1"/>
-          </a:fillRef>
-          <a:effectRef idx="0">
-            <a:schemeClr val="accent1"/>
-          </a:effectRef>
-          <a:fontRef idx="minor">
-            <a:schemeClr val="lt1"/>
-          </a:fontRef>
-        </p:style>
-        <p:txBody>
-          <a:bodyPr rtlCol="0" anchor="ctr"/>
-          <a:lstStyle/>
-          <a:p>
-            <a:pPr algn="ctr"/>
-            <a:endParaRPr lang="en-BE"/>
-          </a:p>
-        </p:txBody>
-      </p:sp>
-      <p:sp>
-        <p:nvSpPr>
-          <p:cNvPr id="74" name="Down Arrow 73">
-            <a:extLst>
-              <a:ext uri="{FF2B5EF4-FFF2-40B4-BE49-F238E27FC236}">
-                <a16:creationId xmlns:a16="http://schemas.microsoft.com/office/drawing/2014/main" id="{33291FF8-67CC-D415-F02C-0AC1066537C2}"/>
-              </a:ext>
-            </a:extLst>
-          </p:cNvPr>
-          <p:cNvSpPr/>
-          <p:nvPr/>
-        </p:nvSpPr>
-        <p:spPr>
-          <a:xfrm>
-            <a:off x="11114309" y="4280374"/>
-            <a:ext cx="540000" cy="540000"/>
-          </a:xfrm>
-          <a:prstGeom prst="downArrow">
-            <a:avLst/>
-          </a:prstGeom>
-          <a:solidFill>
-            <a:schemeClr val="bg2">
-              <a:lumMod val="90000"/>
-            </a:schemeClr>
-          </a:solidFill>
-          <a:ln>
-            <a:noFill/>
-          </a:ln>
-        </p:spPr>
-        <p:style>
-          <a:lnRef idx="2">
-            <a:schemeClr val="accent1">
-              <a:shade val="50000"/>
-            </a:schemeClr>
-          </a:lnRef>
-          <a:fillRef idx="1">
-            <a:schemeClr val="accent1"/>
-          </a:fillRef>
-          <a:effectRef idx="0">
-            <a:schemeClr val="accent1"/>
-          </a:effectRef>
-          <a:fontRef idx="minor">
-            <a:schemeClr val="lt1"/>
-          </a:fontRef>
-        </p:style>
-        <p:txBody>
-          <a:bodyPr rtlCol="0" anchor="ctr"/>
-          <a:lstStyle/>
-          <a:p>
-            <a:pPr algn="ctr"/>
-            <a:endParaRPr lang="en-BE"/>
-          </a:p>
-        </p:txBody>
-      </p:sp>
-      <p:sp>
-        <p:nvSpPr>
-          <p:cNvPr id="75" name="Down Arrow 74">
-            <a:extLst>
-              <a:ext uri="{FF2B5EF4-FFF2-40B4-BE49-F238E27FC236}">
-                <a16:creationId xmlns:a16="http://schemas.microsoft.com/office/drawing/2014/main" id="{E0232A55-7107-96B2-675E-049800CEAE50}"/>
-              </a:ext>
-            </a:extLst>
-          </p:cNvPr>
-          <p:cNvSpPr/>
-          <p:nvPr/>
-        </p:nvSpPr>
-        <p:spPr>
-          <a:xfrm>
-            <a:off x="11114309" y="8727651"/>
-            <a:ext cx="540000" cy="540000"/>
-          </a:xfrm>
-          <a:prstGeom prst="downArrow">
-            <a:avLst/>
-          </a:prstGeom>
-          <a:solidFill>
-            <a:schemeClr val="bg2">
-              <a:lumMod val="90000"/>
-            </a:schemeClr>
-          </a:solidFill>
-          <a:ln>
-            <a:noFill/>
-          </a:ln>
-        </p:spPr>
-        <p:style>
-          <a:lnRef idx="2">
-            <a:schemeClr val="accent1">
-              <a:shade val="50000"/>
-            </a:schemeClr>
-          </a:lnRef>
-          <a:fillRef idx="1">
-            <a:schemeClr val="accent1"/>
-          </a:fillRef>
-          <a:effectRef idx="0">
-            <a:schemeClr val="accent1"/>
-          </a:effectRef>
-          <a:fontRef idx="minor">
-            <a:schemeClr val="lt1"/>
-          </a:fontRef>
-        </p:style>
-        <p:txBody>
-          <a:bodyPr rtlCol="0" anchor="ctr"/>
-          <a:lstStyle/>
-          <a:p>
-            <a:pPr algn="ctr"/>
-            <a:endParaRPr lang="en-BE"/>
-          </a:p>
-        </p:txBody>
-      </p:sp>
-      <p:sp>
-        <p:nvSpPr>
-          <p:cNvPr id="76" name="Down Arrow 75">
-            <a:extLst>
-              <a:ext uri="{FF2B5EF4-FFF2-40B4-BE49-F238E27FC236}">
-                <a16:creationId xmlns:a16="http://schemas.microsoft.com/office/drawing/2014/main" id="{C4C4BB2B-9D29-5444-0DDF-EAE74D0F9A41}"/>
-              </a:ext>
-            </a:extLst>
-          </p:cNvPr>
-          <p:cNvSpPr/>
-          <p:nvPr/>
-        </p:nvSpPr>
-        <p:spPr>
-          <a:xfrm>
-            <a:off x="11114309" y="13186825"/>
-            <a:ext cx="540000" cy="540000"/>
-          </a:xfrm>
-          <a:prstGeom prst="downArrow">
-            <a:avLst/>
-          </a:prstGeom>
-          <a:solidFill>
-            <a:schemeClr val="bg2">
-              <a:lumMod val="90000"/>
-            </a:schemeClr>
-          </a:solidFill>
-          <a:ln>
-            <a:noFill/>
-          </a:ln>
-        </p:spPr>
-        <p:style>
-          <a:lnRef idx="2">
-            <a:schemeClr val="accent1">
-              <a:shade val="50000"/>
-            </a:schemeClr>
-          </a:lnRef>
-          <a:fillRef idx="1">
-            <a:schemeClr val="accent1"/>
-          </a:fillRef>
-          <a:effectRef idx="0">
-            <a:schemeClr val="accent1"/>
-          </a:effectRef>
-          <a:fontRef idx="minor">
-            <a:schemeClr val="lt1"/>
-          </a:fontRef>
-        </p:style>
-        <p:txBody>
-          <a:bodyPr rtlCol="0" anchor="ctr"/>
-          <a:lstStyle/>
-          <a:p>
-            <a:pPr algn="ctr"/>
-            <a:endParaRPr lang="en-BE"/>
-          </a:p>
-        </p:txBody>
-      </p:sp>
+      </p:pic>
     </p:spTree>
     <p:extLst>
       <p:ext uri="{BB962C8B-B14F-4D97-AF65-F5344CB8AC3E}">
@@ -5013,7 +5742,7 @@
   <a:extraClrSchemeLst/>
   <a:extLst>
     <a:ext uri="{05A4C25C-085E-4340-85A3-A5531E510DB2}">
-      <thm15:themeFamily xmlns:thm15="http://schemas.microsoft.com/office/thememl/2012/main" name="Office Theme" id="{62F939B6-93AF-4DB8-9C6B-D6C7DFDC589F}" vid="{4A3C46E8-61CC-4603-A589-7422A47A8E4A}"/>
+      <thm15:themeFamily xmlns:thm15="http://schemas.microsoft.com/office/thememl/2012/main" name="Office Theme 2013 - 2022" id="{62F939B6-93AF-4DB8-9C6B-D6C7DFDC589F}" vid="{4A3C46E8-61CC-4603-A589-7422A47A8E4A}"/>
     </a:ext>
   </a:extLst>
 </a:theme>

</xml_diff>